<commit_message>
Deploying to gh-pages from @ sean4andrew/safuncs@902b0b37ebce515e28455e8acd7bd9ff5119ea95 🚀
</commit_message>
<xml_diff>
--- a/reference/plot_prefix-Hazard-Curve.pptx
+++ b/reference/plot_prefix-Hazard-Curve.pptx
@@ -2359,7 +2359,7 @@
           </p:nvSpPr>
           <p:spPr>
             <a:xfrm>
-              <a:off x="1461154" y="3601355"/>
+              <a:off x="1461154" y="3556681"/>
               <a:ext cx="4200976" cy="0"/>
             </a:xfrm>
             <a:custGeom>
@@ -2402,7 +2402,7 @@
           </p:nvSpPr>
           <p:spPr>
             <a:xfrm>
-              <a:off x="1461154" y="2754914"/>
+              <a:off x="1461154" y="2590554"/>
               <a:ext cx="4200976" cy="0"/>
             </a:xfrm>
             <a:custGeom>
@@ -2445,7 +2445,7 @@
           </p:nvSpPr>
           <p:spPr>
             <a:xfrm>
-              <a:off x="1461154" y="1908473"/>
+              <a:off x="1461154" y="1624427"/>
               <a:ext cx="4200976" cy="0"/>
             </a:xfrm>
             <a:custGeom>
@@ -2483,49 +2483,6 @@
         <p:sp>
           <p:nvSpPr>
             <p:cNvPr id="10" name="pl9"/>
-            <p:cNvSpPr/>
-            <p:nvPr/>
-          </p:nvSpPr>
-          <p:spPr>
-            <a:xfrm>
-              <a:off x="1461154" y="1062033"/>
-              <a:ext cx="4200976" cy="0"/>
-            </a:xfrm>
-            <a:custGeom>
-              <a:avLst/>
-              <a:pathLst>
-                <a:path w="4200976" h="0">
-                  <a:moveTo>
-                    <a:pt x="0" y="0"/>
-                  </a:moveTo>
-                  <a:lnTo>
-                    <a:pt x="4200976" y="0"/>
-                  </a:lnTo>
-                  <a:lnTo>
-                    <a:pt x="4200976" y="0"/>
-                  </a:lnTo>
-                </a:path>
-              </a:pathLst>
-            </a:custGeom>
-            <a:ln w="6775" cap="flat">
-              <a:solidFill>
-                <a:srgbClr val="FFFFFF">
-                  <a:alpha val="100000"/>
-                </a:srgbClr>
-              </a:solidFill>
-              <a:prstDash val="solid"/>
-              <a:round/>
-            </a:ln>
-          </p:spPr>
-          <p:txBody>
-            <a:bodyPr/>
-            <a:lstStyle/>
-            <a:p/>
-          </p:txBody>
-        </p:sp>
-        <p:sp>
-          <p:nvSpPr>
-            <p:cNvPr id="11" name="pl10"/>
             <p:cNvSpPr/>
             <p:nvPr/>
           </p:nvSpPr>
@@ -2568,7 +2525,7 @@
         </p:sp>
         <p:sp>
           <p:nvSpPr>
-            <p:cNvPr id="12" name="pl11"/>
+            <p:cNvPr id="11" name="pl10"/>
             <p:cNvSpPr/>
             <p:nvPr/>
           </p:nvSpPr>
@@ -2611,7 +2568,7 @@
         </p:sp>
         <p:sp>
           <p:nvSpPr>
-            <p:cNvPr id="13" name="pl12"/>
+            <p:cNvPr id="12" name="pl11"/>
             <p:cNvSpPr/>
             <p:nvPr/>
           </p:nvSpPr>
@@ -2654,7 +2611,7 @@
         </p:sp>
         <p:sp>
           <p:nvSpPr>
-            <p:cNvPr id="14" name="pl13"/>
+            <p:cNvPr id="13" name="pl12"/>
             <p:cNvSpPr/>
             <p:nvPr/>
           </p:nvSpPr>
@@ -2697,7 +2654,7 @@
         </p:sp>
         <p:sp>
           <p:nvSpPr>
-            <p:cNvPr id="15" name="pl14"/>
+            <p:cNvPr id="14" name="pl13"/>
             <p:cNvSpPr/>
             <p:nvPr/>
           </p:nvSpPr>
@@ -2740,7 +2697,7 @@
         </p:sp>
         <p:sp>
           <p:nvSpPr>
-            <p:cNvPr id="16" name="pl15"/>
+            <p:cNvPr id="15" name="pl14"/>
             <p:cNvSpPr/>
             <p:nvPr/>
           </p:nvSpPr>
@@ -2783,7 +2740,7 @@
         </p:sp>
         <p:sp>
           <p:nvSpPr>
-            <p:cNvPr id="17" name="pl16"/>
+            <p:cNvPr id="16" name="pl15"/>
             <p:cNvSpPr/>
             <p:nvPr/>
           </p:nvSpPr>
@@ -2826,7 +2783,7 @@
         </p:sp>
         <p:sp>
           <p:nvSpPr>
-            <p:cNvPr id="18" name="pl17"/>
+            <p:cNvPr id="17" name="pl16"/>
             <p:cNvSpPr/>
             <p:nvPr/>
           </p:nvSpPr>
@@ -2869,7 +2826,7 @@
         </p:sp>
         <p:sp>
           <p:nvSpPr>
-            <p:cNvPr id="19" name="pl18"/>
+            <p:cNvPr id="18" name="pl17"/>
             <p:cNvSpPr/>
             <p:nvPr/>
           </p:nvSpPr>
@@ -2912,7 +2869,7 @@
         </p:sp>
         <p:sp>
           <p:nvSpPr>
-            <p:cNvPr id="20" name="pl19"/>
+            <p:cNvPr id="19" name="pl18"/>
             <p:cNvSpPr/>
             <p:nvPr/>
           </p:nvSpPr>
@@ -2955,7 +2912,7 @@
         </p:sp>
         <p:sp>
           <p:nvSpPr>
-            <p:cNvPr id="21" name="pl20"/>
+            <p:cNvPr id="20" name="pl19"/>
             <p:cNvSpPr/>
             <p:nvPr/>
           </p:nvSpPr>
@@ -2998,7 +2955,7 @@
         </p:sp>
         <p:sp>
           <p:nvSpPr>
-            <p:cNvPr id="22" name="pl21"/>
+            <p:cNvPr id="21" name="pl20"/>
             <p:cNvSpPr/>
             <p:nvPr/>
           </p:nvSpPr>
@@ -3041,7 +2998,7 @@
         </p:sp>
         <p:sp>
           <p:nvSpPr>
-            <p:cNvPr id="23" name="pl22"/>
+            <p:cNvPr id="22" name="pl21"/>
             <p:cNvSpPr/>
             <p:nvPr/>
           </p:nvSpPr>
@@ -3084,7 +3041,7 @@
         </p:sp>
         <p:sp>
           <p:nvSpPr>
-            <p:cNvPr id="24" name="pl23"/>
+            <p:cNvPr id="23" name="pl22"/>
             <p:cNvSpPr/>
             <p:nvPr/>
           </p:nvSpPr>
@@ -3127,7 +3084,7 @@
         </p:sp>
         <p:sp>
           <p:nvSpPr>
-            <p:cNvPr id="25" name="pl24"/>
+            <p:cNvPr id="24" name="pl23"/>
             <p:cNvSpPr/>
             <p:nvPr/>
           </p:nvSpPr>
@@ -3170,7 +3127,7 @@
         </p:sp>
         <p:sp>
           <p:nvSpPr>
-            <p:cNvPr id="26" name="pl25"/>
+            <p:cNvPr id="25" name="pl24"/>
             <p:cNvSpPr/>
             <p:nvPr/>
           </p:nvSpPr>
@@ -3213,13 +3170,13 @@
         </p:sp>
         <p:sp>
           <p:nvSpPr>
-            <p:cNvPr id="27" name="pl26"/>
-            <p:cNvSpPr/>
-            <p:nvPr/>
-          </p:nvSpPr>
-          <p:spPr>
-            <a:xfrm>
-              <a:off x="1461154" y="4024575"/>
+            <p:cNvPr id="26" name="pl25"/>
+            <p:cNvSpPr/>
+            <p:nvPr/>
+          </p:nvSpPr>
+          <p:spPr>
+            <a:xfrm>
+              <a:off x="1461154" y="4039744"/>
               <a:ext cx="4200976" cy="0"/>
             </a:xfrm>
             <a:custGeom>
@@ -3256,13 +3213,13 @@
         </p:sp>
         <p:sp>
           <p:nvSpPr>
-            <p:cNvPr id="28" name="pl27"/>
-            <p:cNvSpPr/>
-            <p:nvPr/>
-          </p:nvSpPr>
-          <p:spPr>
-            <a:xfrm>
-              <a:off x="1461154" y="3178134"/>
+            <p:cNvPr id="27" name="pl26"/>
+            <p:cNvSpPr/>
+            <p:nvPr/>
+          </p:nvSpPr>
+          <p:spPr>
+            <a:xfrm>
+              <a:off x="1461154" y="3073617"/>
               <a:ext cx="4200976" cy="0"/>
             </a:xfrm>
             <a:custGeom>
@@ -3299,13 +3256,13 @@
         </p:sp>
         <p:sp>
           <p:nvSpPr>
-            <p:cNvPr id="29" name="pl28"/>
-            <p:cNvSpPr/>
-            <p:nvPr/>
-          </p:nvSpPr>
-          <p:spPr>
-            <a:xfrm>
-              <a:off x="1461154" y="2331694"/>
+            <p:cNvPr id="28" name="pl27"/>
+            <p:cNvSpPr/>
+            <p:nvPr/>
+          </p:nvSpPr>
+          <p:spPr>
+            <a:xfrm>
+              <a:off x="1461154" y="2107490"/>
               <a:ext cx="4200976" cy="0"/>
             </a:xfrm>
             <a:custGeom>
@@ -3342,13 +3299,13 @@
         </p:sp>
         <p:sp>
           <p:nvSpPr>
-            <p:cNvPr id="30" name="pl29"/>
-            <p:cNvSpPr/>
-            <p:nvPr/>
-          </p:nvSpPr>
-          <p:spPr>
-            <a:xfrm>
-              <a:off x="1461154" y="1485253"/>
+            <p:cNvPr id="29" name="pl28"/>
+            <p:cNvSpPr/>
+            <p:nvPr/>
+          </p:nvSpPr>
+          <p:spPr>
+            <a:xfrm>
+              <a:off x="1461154" y="1141363"/>
               <a:ext cx="4200976" cy="0"/>
             </a:xfrm>
             <a:custGeom>
@@ -3385,7 +3342,7 @@
         </p:sp>
         <p:sp>
           <p:nvSpPr>
-            <p:cNvPr id="31" name="pl30"/>
+            <p:cNvPr id="30" name="pl29"/>
             <p:cNvSpPr/>
             <p:nvPr/>
           </p:nvSpPr>
@@ -3428,7 +3385,7 @@
         </p:sp>
         <p:sp>
           <p:nvSpPr>
-            <p:cNvPr id="32" name="pl31"/>
+            <p:cNvPr id="31" name="pl30"/>
             <p:cNvSpPr/>
             <p:nvPr/>
           </p:nvSpPr>
@@ -3471,7 +3428,7 @@
         </p:sp>
         <p:sp>
           <p:nvSpPr>
-            <p:cNvPr id="33" name="pl32"/>
+            <p:cNvPr id="32" name="pl31"/>
             <p:cNvSpPr/>
             <p:nvPr/>
           </p:nvSpPr>
@@ -3514,7 +3471,7 @@
         </p:sp>
         <p:sp>
           <p:nvSpPr>
-            <p:cNvPr id="34" name="pl33"/>
+            <p:cNvPr id="33" name="pl32"/>
             <p:cNvSpPr/>
             <p:nvPr/>
           </p:nvSpPr>
@@ -3557,7 +3514,7 @@
         </p:sp>
         <p:sp>
           <p:nvSpPr>
-            <p:cNvPr id="35" name="pl34"/>
+            <p:cNvPr id="34" name="pl33"/>
             <p:cNvSpPr/>
             <p:nvPr/>
           </p:nvSpPr>
@@ -3600,7 +3557,7 @@
         </p:sp>
         <p:sp>
           <p:nvSpPr>
-            <p:cNvPr id="36" name="pl35"/>
+            <p:cNvPr id="35" name="pl34"/>
             <p:cNvSpPr/>
             <p:nvPr/>
           </p:nvSpPr>
@@ -3643,7 +3600,7 @@
         </p:sp>
         <p:sp>
           <p:nvSpPr>
-            <p:cNvPr id="37" name="pl36"/>
+            <p:cNvPr id="36" name="pl35"/>
             <p:cNvSpPr/>
             <p:nvPr/>
           </p:nvSpPr>
@@ -3686,7 +3643,7 @@
         </p:sp>
         <p:sp>
           <p:nvSpPr>
-            <p:cNvPr id="38" name="pl37"/>
+            <p:cNvPr id="37" name="pl36"/>
             <p:cNvSpPr/>
             <p:nvPr/>
           </p:nvSpPr>
@@ -3729,7 +3686,7 @@
         </p:sp>
         <p:sp>
           <p:nvSpPr>
-            <p:cNvPr id="39" name="pl38"/>
+            <p:cNvPr id="38" name="pl37"/>
             <p:cNvSpPr/>
             <p:nvPr/>
           </p:nvSpPr>
@@ -3772,7 +3729,7 @@
         </p:sp>
         <p:sp>
           <p:nvSpPr>
-            <p:cNvPr id="40" name="pl39"/>
+            <p:cNvPr id="39" name="pl38"/>
             <p:cNvSpPr/>
             <p:nvPr/>
           </p:nvSpPr>
@@ -3815,7 +3772,7 @@
         </p:sp>
         <p:sp>
           <p:nvSpPr>
-            <p:cNvPr id="41" name="pl40"/>
+            <p:cNvPr id="40" name="pl39"/>
             <p:cNvSpPr/>
             <p:nvPr/>
           </p:nvSpPr>
@@ -3858,7 +3815,7 @@
         </p:sp>
         <p:sp>
           <p:nvSpPr>
-            <p:cNvPr id="42" name="pl41"/>
+            <p:cNvPr id="41" name="pl40"/>
             <p:cNvSpPr/>
             <p:nvPr/>
           </p:nvSpPr>
@@ -3901,7 +3858,7 @@
         </p:sp>
         <p:sp>
           <p:nvSpPr>
-            <p:cNvPr id="43" name="pl42"/>
+            <p:cNvPr id="42" name="pl41"/>
             <p:cNvSpPr/>
             <p:nvPr/>
           </p:nvSpPr>
@@ -3944,7 +3901,7 @@
         </p:sp>
         <p:sp>
           <p:nvSpPr>
-            <p:cNvPr id="44" name="pl43"/>
+            <p:cNvPr id="43" name="pl42"/>
             <p:cNvSpPr/>
             <p:nvPr/>
           </p:nvSpPr>
@@ -3987,180 +3944,93 @@
         </p:sp>
         <p:sp>
           <p:nvSpPr>
-            <p:cNvPr id="45" name="pl44"/>
-            <p:cNvSpPr/>
-            <p:nvPr/>
-          </p:nvSpPr>
-          <p:spPr>
-            <a:xfrm>
-              <a:off x="1687470" y="1128778"/>
-              <a:ext cx="3748346" cy="2895796"/>
+            <p:cNvPr id="44" name="pl43"/>
+            <p:cNvSpPr/>
+            <p:nvPr/>
+          </p:nvSpPr>
+          <p:spPr>
+            <a:xfrm>
+              <a:off x="2465428" y="1128778"/>
+              <a:ext cx="2864302" cy="2895796"/>
             </a:xfrm>
             <a:custGeom>
               <a:avLst/>
               <a:pathLst>
-                <a:path w="3748346" h="2895796">
+                <a:path w="2864302" h="2895796">
                   <a:moveTo>
                     <a:pt x="0" y="2895796"/>
                   </a:moveTo>
                   <a:lnTo>
-                    <a:pt x="70723" y="2895796"/>
-                  </a:lnTo>
-                  <a:lnTo>
-                    <a:pt x="141447" y="2895796"/>
-                  </a:lnTo>
-                  <a:lnTo>
-                    <a:pt x="212170" y="2895796"/>
-                  </a:lnTo>
-                  <a:lnTo>
-                    <a:pt x="282894" y="2895796"/>
-                  </a:lnTo>
-                  <a:lnTo>
-                    <a:pt x="353617" y="2895796"/>
-                  </a:lnTo>
-                  <a:lnTo>
-                    <a:pt x="424341" y="2895795"/>
-                  </a:lnTo>
-                  <a:lnTo>
-                    <a:pt x="495064" y="2895794"/>
-                  </a:lnTo>
-                  <a:lnTo>
-                    <a:pt x="565788" y="2895792"/>
-                  </a:lnTo>
-                  <a:lnTo>
-                    <a:pt x="636511" y="2895788"/>
-                  </a:lnTo>
-                  <a:lnTo>
-                    <a:pt x="707235" y="2895780"/>
-                  </a:lnTo>
-                  <a:lnTo>
-                    <a:pt x="777958" y="2895761"/>
-                  </a:lnTo>
-                  <a:lnTo>
-                    <a:pt x="848682" y="2895722"/>
-                  </a:lnTo>
-                  <a:lnTo>
-                    <a:pt x="919405" y="2895641"/>
-                  </a:lnTo>
-                  <a:lnTo>
-                    <a:pt x="990129" y="2895467"/>
-                  </a:lnTo>
-                  <a:lnTo>
-                    <a:pt x="1060852" y="2895102"/>
-                  </a:lnTo>
-                  <a:lnTo>
-                    <a:pt x="1131576" y="2894330"/>
-                  </a:lnTo>
-                  <a:lnTo>
-                    <a:pt x="1202299" y="2892704"/>
-                  </a:lnTo>
-                  <a:lnTo>
-                    <a:pt x="1273023" y="2889289"/>
-                  </a:lnTo>
-                  <a:lnTo>
-                    <a:pt x="1343746" y="2882150"/>
-                  </a:lnTo>
-                  <a:lnTo>
-                    <a:pt x="1414470" y="2867526"/>
-                  </a:lnTo>
-                  <a:lnTo>
-                    <a:pt x="1485193" y="2837768"/>
-                  </a:lnTo>
-                  <a:lnTo>
-                    <a:pt x="1555917" y="2783839"/>
-                  </a:lnTo>
-                  <a:lnTo>
-                    <a:pt x="1626640" y="2683813"/>
-                  </a:lnTo>
-                  <a:lnTo>
-                    <a:pt x="1697364" y="2531212"/>
-                  </a:lnTo>
-                  <a:lnTo>
-                    <a:pt x="1768087" y="2336226"/>
-                  </a:lnTo>
-                  <a:lnTo>
-                    <a:pt x="1838811" y="2267813"/>
-                  </a:lnTo>
-                  <a:lnTo>
-                    <a:pt x="1909534" y="2211885"/>
-                  </a:lnTo>
-                  <a:lnTo>
-                    <a:pt x="1980258" y="2173010"/>
-                  </a:lnTo>
-                  <a:lnTo>
-                    <a:pt x="2050981" y="1975660"/>
-                  </a:lnTo>
-                  <a:lnTo>
-                    <a:pt x="2121705" y="1642403"/>
-                  </a:lnTo>
-                  <a:lnTo>
-                    <a:pt x="2192428" y="1271367"/>
-                  </a:lnTo>
-                  <a:lnTo>
-                    <a:pt x="2263152" y="838577"/>
-                  </a:lnTo>
-                  <a:lnTo>
-                    <a:pt x="2333875" y="504086"/>
-                  </a:lnTo>
-                  <a:lnTo>
-                    <a:pt x="2404599" y="206204"/>
-                  </a:lnTo>
-                  <a:lnTo>
-                    <a:pt x="2475322" y="0"/>
-                  </a:lnTo>
-                  <a:lnTo>
-                    <a:pt x="2546046" y="407290"/>
-                  </a:lnTo>
-                  <a:lnTo>
-                    <a:pt x="2616769" y="985269"/>
-                  </a:lnTo>
-                  <a:lnTo>
-                    <a:pt x="2687493" y="1323640"/>
-                  </a:lnTo>
-                  <a:lnTo>
-                    <a:pt x="2758216" y="1609777"/>
-                  </a:lnTo>
-                  <a:lnTo>
-                    <a:pt x="2828940" y="1933298"/>
-                  </a:lnTo>
-                  <a:lnTo>
-                    <a:pt x="2899663" y="2082105"/>
-                  </a:lnTo>
-                  <a:lnTo>
-                    <a:pt x="2970387" y="2046800"/>
-                  </a:lnTo>
-                  <a:lnTo>
-                    <a:pt x="3041110" y="1893380"/>
-                  </a:lnTo>
-                  <a:lnTo>
-                    <a:pt x="3111834" y="1610544"/>
-                  </a:lnTo>
-                  <a:lnTo>
-                    <a:pt x="3182557" y="1424078"/>
-                  </a:lnTo>
-                  <a:lnTo>
-                    <a:pt x="3253281" y="1271332"/>
-                  </a:lnTo>
-                  <a:lnTo>
-                    <a:pt x="3324004" y="1424267"/>
-                  </a:lnTo>
-                  <a:lnTo>
-                    <a:pt x="3394728" y="1705603"/>
-                  </a:lnTo>
-                  <a:lnTo>
-                    <a:pt x="3465451" y="2156809"/>
-                  </a:lnTo>
-                  <a:lnTo>
-                    <a:pt x="3536175" y="2443154"/>
-                  </a:lnTo>
-                  <a:lnTo>
-                    <a:pt x="3606899" y="2621823"/>
-                  </a:lnTo>
-                  <a:lnTo>
-                    <a:pt x="3677622" y="2709088"/>
-                  </a:lnTo>
-                  <a:lnTo>
-                    <a:pt x="3748346" y="2763881"/>
+                    <a:pt x="919405" y="2435384"/>
+                  </a:lnTo>
+                  <a:lnTo>
+                    <a:pt x="1060852" y="2264473"/>
+                  </a:lnTo>
+                  <a:lnTo>
+                    <a:pt x="1166937" y="2097564"/>
+                  </a:lnTo>
+                  <a:lnTo>
+                    <a:pt x="1273023" y="1775523"/>
+                  </a:lnTo>
+                  <a:lnTo>
+                    <a:pt x="1343746" y="1445228"/>
+                  </a:lnTo>
+                  <a:lnTo>
+                    <a:pt x="1414470" y="1036874"/>
+                  </a:lnTo>
+                  <a:lnTo>
+                    <a:pt x="1485193" y="638503"/>
+                  </a:lnTo>
+                  <a:lnTo>
+                    <a:pt x="1555917" y="277788"/>
+                  </a:lnTo>
+                  <a:lnTo>
+                    <a:pt x="1626640" y="0"/>
+                  </a:lnTo>
+                  <a:lnTo>
+                    <a:pt x="1697364" y="8222"/>
+                  </a:lnTo>
+                  <a:lnTo>
+                    <a:pt x="1768087" y="271853"/>
+                  </a:lnTo>
+                  <a:lnTo>
+                    <a:pt x="1838811" y="638587"/>
+                  </a:lnTo>
+                  <a:lnTo>
+                    <a:pt x="1909534" y="1007435"/>
+                  </a:lnTo>
+                  <a:lnTo>
+                    <a:pt x="1980258" y="1302762"/>
+                  </a:lnTo>
+                  <a:lnTo>
+                    <a:pt x="2050981" y="1518319"/>
+                  </a:lnTo>
+                  <a:lnTo>
+                    <a:pt x="2157067" y="1668109"/>
+                  </a:lnTo>
+                  <a:lnTo>
+                    <a:pt x="2263152" y="1603884"/>
+                  </a:lnTo>
+                  <a:lnTo>
+                    <a:pt x="2333875" y="1503143"/>
+                  </a:lnTo>
+                  <a:lnTo>
+                    <a:pt x="2404599" y="1407930"/>
+                  </a:lnTo>
+                  <a:lnTo>
+                    <a:pt x="2475322" y="1363759"/>
+                  </a:lnTo>
+                  <a:lnTo>
+                    <a:pt x="2546046" y="1486071"/>
+                  </a:lnTo>
+                  <a:lnTo>
+                    <a:pt x="2616769" y="1723045"/>
+                  </a:lnTo>
+                  <a:lnTo>
+                    <a:pt x="2687493" y="2009622"/>
+                  </a:lnTo>
+                  <a:lnTo>
+                    <a:pt x="2864302" y="2578203"/>
                   </a:lnTo>
                 </a:path>
               </a:pathLst>
@@ -4183,13 +4053,13 @@
         </p:sp>
         <p:sp>
           <p:nvSpPr>
-            <p:cNvPr id="46" name="pt45"/>
-            <p:cNvSpPr/>
-            <p:nvPr/>
-          </p:nvSpPr>
-          <p:spPr>
-            <a:xfrm>
-              <a:off x="1662644" y="3999749"/>
+            <p:cNvPr id="45" name="pt44"/>
+            <p:cNvSpPr/>
+            <p:nvPr/>
+          </p:nvSpPr>
+          <p:spPr>
+            <a:xfrm>
+              <a:off x="2440602" y="3999749"/>
               <a:ext cx="49651" cy="49651"/>
             </a:xfrm>
             <a:prstGeom prst="ellipse">
@@ -4218,13 +4088,13 @@
         </p:sp>
         <p:sp>
           <p:nvSpPr>
-            <p:cNvPr id="47" name="pt46"/>
-            <p:cNvSpPr/>
-            <p:nvPr/>
-          </p:nvSpPr>
-          <p:spPr>
-            <a:xfrm>
-              <a:off x="1733367" y="3999749"/>
+            <p:cNvPr id="46" name="pt45"/>
+            <p:cNvSpPr/>
+            <p:nvPr/>
+          </p:nvSpPr>
+          <p:spPr>
+            <a:xfrm>
+              <a:off x="3360008" y="3539337"/>
               <a:ext cx="49651" cy="49651"/>
             </a:xfrm>
             <a:prstGeom prst="ellipse">
@@ -4253,13 +4123,13 @@
         </p:sp>
         <p:sp>
           <p:nvSpPr>
-            <p:cNvPr id="48" name="pt47"/>
-            <p:cNvSpPr/>
-            <p:nvPr/>
-          </p:nvSpPr>
-          <p:spPr>
-            <a:xfrm>
-              <a:off x="1804091" y="3999749"/>
+            <p:cNvPr id="47" name="pt46"/>
+            <p:cNvSpPr/>
+            <p:nvPr/>
+          </p:nvSpPr>
+          <p:spPr>
+            <a:xfrm>
+              <a:off x="3501455" y="3368426"/>
               <a:ext cx="49651" cy="49651"/>
             </a:xfrm>
             <a:prstGeom prst="ellipse">
@@ -4288,13 +4158,13 @@
         </p:sp>
         <p:sp>
           <p:nvSpPr>
-            <p:cNvPr id="49" name="pt48"/>
-            <p:cNvSpPr/>
-            <p:nvPr/>
-          </p:nvSpPr>
-          <p:spPr>
-            <a:xfrm>
-              <a:off x="1874814" y="3999749"/>
+            <p:cNvPr id="48" name="pt47"/>
+            <p:cNvSpPr/>
+            <p:nvPr/>
+          </p:nvSpPr>
+          <p:spPr>
+            <a:xfrm>
+              <a:off x="3607540" y="3201517"/>
               <a:ext cx="49651" cy="49651"/>
             </a:xfrm>
             <a:prstGeom prst="ellipse">
@@ -4323,13 +4193,13 @@
         </p:sp>
         <p:sp>
           <p:nvSpPr>
-            <p:cNvPr id="50" name="pt49"/>
-            <p:cNvSpPr/>
-            <p:nvPr/>
-          </p:nvSpPr>
-          <p:spPr>
-            <a:xfrm>
-              <a:off x="1945538" y="3999749"/>
+            <p:cNvPr id="49" name="pt48"/>
+            <p:cNvSpPr/>
+            <p:nvPr/>
+          </p:nvSpPr>
+          <p:spPr>
+            <a:xfrm>
+              <a:off x="3713625" y="2879476"/>
               <a:ext cx="49651" cy="49651"/>
             </a:xfrm>
             <a:prstGeom prst="ellipse">
@@ -4358,13 +4228,13 @@
         </p:sp>
         <p:sp>
           <p:nvSpPr>
-            <p:cNvPr id="51" name="pt50"/>
-            <p:cNvSpPr/>
-            <p:nvPr/>
-          </p:nvSpPr>
-          <p:spPr>
-            <a:xfrm>
-              <a:off x="2016261" y="3999749"/>
+            <p:cNvPr id="50" name="pt49"/>
+            <p:cNvSpPr/>
+            <p:nvPr/>
+          </p:nvSpPr>
+          <p:spPr>
+            <a:xfrm>
+              <a:off x="3784349" y="2549181"/>
               <a:ext cx="49651" cy="49651"/>
             </a:xfrm>
             <a:prstGeom prst="ellipse">
@@ -4393,13 +4263,13 @@
         </p:sp>
         <p:sp>
           <p:nvSpPr>
-            <p:cNvPr id="52" name="pt51"/>
-            <p:cNvSpPr/>
-            <p:nvPr/>
-          </p:nvSpPr>
-          <p:spPr>
-            <a:xfrm>
-              <a:off x="2086985" y="3999748"/>
+            <p:cNvPr id="51" name="pt50"/>
+            <p:cNvSpPr/>
+            <p:nvPr/>
+          </p:nvSpPr>
+          <p:spPr>
+            <a:xfrm>
+              <a:off x="3855072" y="2140827"/>
               <a:ext cx="49651" cy="49651"/>
             </a:xfrm>
             <a:prstGeom prst="ellipse">
@@ -4428,13 +4298,13 @@
         </p:sp>
         <p:sp>
           <p:nvSpPr>
-            <p:cNvPr id="53" name="pt52"/>
-            <p:cNvSpPr/>
-            <p:nvPr/>
-          </p:nvSpPr>
-          <p:spPr>
-            <a:xfrm>
-              <a:off x="2157708" y="3999747"/>
+            <p:cNvPr id="52" name="pt51"/>
+            <p:cNvSpPr/>
+            <p:nvPr/>
+          </p:nvSpPr>
+          <p:spPr>
+            <a:xfrm>
+              <a:off x="3925796" y="1742456"/>
               <a:ext cx="49651" cy="49651"/>
             </a:xfrm>
             <a:prstGeom prst="ellipse">
@@ -4463,13 +4333,13 @@
         </p:sp>
         <p:sp>
           <p:nvSpPr>
-            <p:cNvPr id="54" name="pt53"/>
-            <p:cNvSpPr/>
-            <p:nvPr/>
-          </p:nvSpPr>
-          <p:spPr>
-            <a:xfrm>
-              <a:off x="2228432" y="3999745"/>
+            <p:cNvPr id="53" name="pt52"/>
+            <p:cNvSpPr/>
+            <p:nvPr/>
+          </p:nvSpPr>
+          <p:spPr>
+            <a:xfrm>
+              <a:off x="3996519" y="1381741"/>
               <a:ext cx="49651" cy="49651"/>
             </a:xfrm>
             <a:prstGeom prst="ellipse">
@@ -4498,13 +4368,13 @@
         </p:sp>
         <p:sp>
           <p:nvSpPr>
-            <p:cNvPr id="55" name="pt54"/>
-            <p:cNvSpPr/>
-            <p:nvPr/>
-          </p:nvSpPr>
-          <p:spPr>
-            <a:xfrm>
-              <a:off x="2299155" y="3999741"/>
+            <p:cNvPr id="54" name="pt53"/>
+            <p:cNvSpPr/>
+            <p:nvPr/>
+          </p:nvSpPr>
+          <p:spPr>
+            <a:xfrm>
+              <a:off x="4067243" y="1103952"/>
               <a:ext cx="49651" cy="49651"/>
             </a:xfrm>
             <a:prstGeom prst="ellipse">
@@ -4533,13 +4403,13 @@
         </p:sp>
         <p:sp>
           <p:nvSpPr>
-            <p:cNvPr id="56" name="pt55"/>
-            <p:cNvSpPr/>
-            <p:nvPr/>
-          </p:nvSpPr>
-          <p:spPr>
-            <a:xfrm>
-              <a:off x="2369879" y="3999733"/>
+            <p:cNvPr id="55" name="pt54"/>
+            <p:cNvSpPr/>
+            <p:nvPr/>
+          </p:nvSpPr>
+          <p:spPr>
+            <a:xfrm>
+              <a:off x="4137967" y="1112175"/>
               <a:ext cx="49651" cy="49651"/>
             </a:xfrm>
             <a:prstGeom prst="ellipse">
@@ -4568,13 +4438,13 @@
         </p:sp>
         <p:sp>
           <p:nvSpPr>
-            <p:cNvPr id="57" name="pt56"/>
-            <p:cNvSpPr/>
-            <p:nvPr/>
-          </p:nvSpPr>
-          <p:spPr>
-            <a:xfrm>
-              <a:off x="2440602" y="3999714"/>
+            <p:cNvPr id="56" name="pt55"/>
+            <p:cNvSpPr/>
+            <p:nvPr/>
+          </p:nvSpPr>
+          <p:spPr>
+            <a:xfrm>
+              <a:off x="4208690" y="1375806"/>
               <a:ext cx="49651" cy="49651"/>
             </a:xfrm>
             <a:prstGeom prst="ellipse">
@@ -4603,13 +4473,13 @@
         </p:sp>
         <p:sp>
           <p:nvSpPr>
-            <p:cNvPr id="58" name="pt57"/>
-            <p:cNvSpPr/>
-            <p:nvPr/>
-          </p:nvSpPr>
-          <p:spPr>
-            <a:xfrm>
-              <a:off x="2511326" y="3999675"/>
+            <p:cNvPr id="57" name="pt56"/>
+            <p:cNvSpPr/>
+            <p:nvPr/>
+          </p:nvSpPr>
+          <p:spPr>
+            <a:xfrm>
+              <a:off x="4279414" y="1742540"/>
               <a:ext cx="49651" cy="49651"/>
             </a:xfrm>
             <a:prstGeom prst="ellipse">
@@ -4638,13 +4508,13 @@
         </p:sp>
         <p:sp>
           <p:nvSpPr>
-            <p:cNvPr id="59" name="pt58"/>
-            <p:cNvSpPr/>
-            <p:nvPr/>
-          </p:nvSpPr>
-          <p:spPr>
-            <a:xfrm>
-              <a:off x="2582049" y="3999593"/>
+            <p:cNvPr id="58" name="pt57"/>
+            <p:cNvSpPr/>
+            <p:nvPr/>
+          </p:nvSpPr>
+          <p:spPr>
+            <a:xfrm>
+              <a:off x="4350137" y="2111388"/>
               <a:ext cx="49651" cy="49651"/>
             </a:xfrm>
             <a:prstGeom prst="ellipse">
@@ -4673,13 +4543,13 @@
         </p:sp>
         <p:sp>
           <p:nvSpPr>
-            <p:cNvPr id="60" name="pt59"/>
-            <p:cNvSpPr/>
-            <p:nvPr/>
-          </p:nvSpPr>
-          <p:spPr>
-            <a:xfrm>
-              <a:off x="2652773" y="3999420"/>
+            <p:cNvPr id="59" name="pt58"/>
+            <p:cNvSpPr/>
+            <p:nvPr/>
+          </p:nvSpPr>
+          <p:spPr>
+            <a:xfrm>
+              <a:off x="4420861" y="2406714"/>
               <a:ext cx="49651" cy="49651"/>
             </a:xfrm>
             <a:prstGeom prst="ellipse">
@@ -4708,13 +4578,13 @@
         </p:sp>
         <p:sp>
           <p:nvSpPr>
-            <p:cNvPr id="61" name="pt60"/>
-            <p:cNvSpPr/>
-            <p:nvPr/>
-          </p:nvSpPr>
-          <p:spPr>
-            <a:xfrm>
-              <a:off x="2723496" y="3999055"/>
+            <p:cNvPr id="60" name="pt59"/>
+            <p:cNvSpPr/>
+            <p:nvPr/>
+          </p:nvSpPr>
+          <p:spPr>
+            <a:xfrm>
+              <a:off x="4491584" y="2622272"/>
               <a:ext cx="49651" cy="49651"/>
             </a:xfrm>
             <a:prstGeom prst="ellipse">
@@ -4743,13 +4613,13 @@
         </p:sp>
         <p:sp>
           <p:nvSpPr>
-            <p:cNvPr id="62" name="pt61"/>
-            <p:cNvSpPr/>
-            <p:nvPr/>
-          </p:nvSpPr>
-          <p:spPr>
-            <a:xfrm>
-              <a:off x="2794220" y="3998283"/>
+            <p:cNvPr id="61" name="pt60"/>
+            <p:cNvSpPr/>
+            <p:nvPr/>
+          </p:nvSpPr>
+          <p:spPr>
+            <a:xfrm>
+              <a:off x="4597669" y="2772062"/>
               <a:ext cx="49651" cy="49651"/>
             </a:xfrm>
             <a:prstGeom prst="ellipse">
@@ -4778,13 +4648,13 @@
         </p:sp>
         <p:sp>
           <p:nvSpPr>
-            <p:cNvPr id="63" name="pt62"/>
-            <p:cNvSpPr/>
-            <p:nvPr/>
-          </p:nvSpPr>
-          <p:spPr>
-            <a:xfrm>
-              <a:off x="2864943" y="3996657"/>
+            <p:cNvPr id="62" name="pt61"/>
+            <p:cNvSpPr/>
+            <p:nvPr/>
+          </p:nvSpPr>
+          <p:spPr>
+            <a:xfrm>
+              <a:off x="4703755" y="2707837"/>
               <a:ext cx="49651" cy="49651"/>
             </a:xfrm>
             <a:prstGeom prst="ellipse">
@@ -4813,13 +4683,13 @@
         </p:sp>
         <p:sp>
           <p:nvSpPr>
-            <p:cNvPr id="64" name="pt63"/>
-            <p:cNvSpPr/>
-            <p:nvPr/>
-          </p:nvSpPr>
-          <p:spPr>
-            <a:xfrm>
-              <a:off x="2935667" y="3993242"/>
+            <p:cNvPr id="63" name="pt62"/>
+            <p:cNvSpPr/>
+            <p:nvPr/>
+          </p:nvSpPr>
+          <p:spPr>
+            <a:xfrm>
+              <a:off x="4774478" y="2607096"/>
               <a:ext cx="49651" cy="49651"/>
             </a:xfrm>
             <a:prstGeom prst="ellipse">
@@ -4848,13 +4718,13 @@
         </p:sp>
         <p:sp>
           <p:nvSpPr>
-            <p:cNvPr id="65" name="pt64"/>
-            <p:cNvSpPr/>
-            <p:nvPr/>
-          </p:nvSpPr>
-          <p:spPr>
-            <a:xfrm>
-              <a:off x="3006390" y="3986103"/>
+            <p:cNvPr id="64" name="pt63"/>
+            <p:cNvSpPr/>
+            <p:nvPr/>
+          </p:nvSpPr>
+          <p:spPr>
+            <a:xfrm>
+              <a:off x="4845202" y="2511883"/>
               <a:ext cx="49651" cy="49651"/>
             </a:xfrm>
             <a:prstGeom prst="ellipse">
@@ -4883,13 +4753,13 @@
         </p:sp>
         <p:sp>
           <p:nvSpPr>
-            <p:cNvPr id="66" name="pt65"/>
-            <p:cNvSpPr/>
-            <p:nvPr/>
-          </p:nvSpPr>
-          <p:spPr>
-            <a:xfrm>
-              <a:off x="3077114" y="3971479"/>
+            <p:cNvPr id="65" name="pt64"/>
+            <p:cNvSpPr/>
+            <p:nvPr/>
+          </p:nvSpPr>
+          <p:spPr>
+            <a:xfrm>
+              <a:off x="4915925" y="2467712"/>
               <a:ext cx="49651" cy="49651"/>
             </a:xfrm>
             <a:prstGeom prst="ellipse">
@@ -4918,13 +4788,13 @@
         </p:sp>
         <p:sp>
           <p:nvSpPr>
-            <p:cNvPr id="67" name="pt66"/>
-            <p:cNvSpPr/>
-            <p:nvPr/>
-          </p:nvSpPr>
-          <p:spPr>
-            <a:xfrm>
-              <a:off x="3147837" y="3941721"/>
+            <p:cNvPr id="66" name="pt65"/>
+            <p:cNvSpPr/>
+            <p:nvPr/>
+          </p:nvSpPr>
+          <p:spPr>
+            <a:xfrm>
+              <a:off x="4986649" y="2590024"/>
               <a:ext cx="49651" cy="49651"/>
             </a:xfrm>
             <a:prstGeom prst="ellipse">
@@ -4953,13 +4823,13 @@
         </p:sp>
         <p:sp>
           <p:nvSpPr>
-            <p:cNvPr id="68" name="pt67"/>
-            <p:cNvSpPr/>
-            <p:nvPr/>
-          </p:nvSpPr>
-          <p:spPr>
-            <a:xfrm>
-              <a:off x="3218561" y="3887792"/>
+            <p:cNvPr id="67" name="pt66"/>
+            <p:cNvSpPr/>
+            <p:nvPr/>
+          </p:nvSpPr>
+          <p:spPr>
+            <a:xfrm>
+              <a:off x="5057372" y="2826998"/>
               <a:ext cx="49651" cy="49651"/>
             </a:xfrm>
             <a:prstGeom prst="ellipse">
@@ -4988,13 +4858,13 @@
         </p:sp>
         <p:sp>
           <p:nvSpPr>
-            <p:cNvPr id="69" name="pt68"/>
-            <p:cNvSpPr/>
-            <p:nvPr/>
-          </p:nvSpPr>
-          <p:spPr>
-            <a:xfrm>
-              <a:off x="3289284" y="3787766"/>
+            <p:cNvPr id="68" name="pt67"/>
+            <p:cNvSpPr/>
+            <p:nvPr/>
+          </p:nvSpPr>
+          <p:spPr>
+            <a:xfrm>
+              <a:off x="5128096" y="3113575"/>
               <a:ext cx="49651" cy="49651"/>
             </a:xfrm>
             <a:prstGeom prst="ellipse">
@@ -5023,13 +4893,13 @@
         </p:sp>
         <p:sp>
           <p:nvSpPr>
-            <p:cNvPr id="70" name="pt69"/>
-            <p:cNvSpPr/>
-            <p:nvPr/>
-          </p:nvSpPr>
-          <p:spPr>
-            <a:xfrm>
-              <a:off x="3360008" y="3635165"/>
+            <p:cNvPr id="69" name="pt68"/>
+            <p:cNvSpPr/>
+            <p:nvPr/>
+          </p:nvSpPr>
+          <p:spPr>
+            <a:xfrm>
+              <a:off x="5304904" y="3682156"/>
               <a:ext cx="49651" cy="49651"/>
             </a:xfrm>
             <a:prstGeom prst="ellipse">
@@ -5058,1028 +4928,13 @@
         </p:sp>
         <p:sp>
           <p:nvSpPr>
-            <p:cNvPr id="71" name="pt70"/>
-            <p:cNvSpPr/>
-            <p:nvPr/>
-          </p:nvSpPr>
-          <p:spPr>
-            <a:xfrm>
-              <a:off x="3430731" y="3440179"/>
-              <a:ext cx="49651" cy="49651"/>
-            </a:xfrm>
-            <a:prstGeom prst="ellipse">
-              <a:avLst/>
-            </a:prstGeom>
-            <a:solidFill>
-              <a:srgbClr val="F8766D">
-                <a:alpha val="100000"/>
-              </a:srgbClr>
-            </a:solidFill>
-            <a:ln w="9000" cap="rnd">
-              <a:solidFill>
-                <a:srgbClr val="F8766D">
-                  <a:alpha val="100000"/>
-                </a:srgbClr>
-              </a:solidFill>
-              <a:prstDash val="solid"/>
-              <a:round/>
-            </a:ln>
-          </p:spPr>
-          <p:txBody>
-            <a:bodyPr/>
-            <a:lstStyle/>
-            <a:p/>
-          </p:txBody>
-        </p:sp>
-        <p:sp>
-          <p:nvSpPr>
-            <p:cNvPr id="72" name="pt71"/>
-            <p:cNvSpPr/>
-            <p:nvPr/>
-          </p:nvSpPr>
-          <p:spPr>
-            <a:xfrm>
-              <a:off x="3501455" y="3371766"/>
-              <a:ext cx="49651" cy="49651"/>
-            </a:xfrm>
-            <a:prstGeom prst="ellipse">
-              <a:avLst/>
-            </a:prstGeom>
-            <a:solidFill>
-              <a:srgbClr val="F8766D">
-                <a:alpha val="100000"/>
-              </a:srgbClr>
-            </a:solidFill>
-            <a:ln w="9000" cap="rnd">
-              <a:solidFill>
-                <a:srgbClr val="F8766D">
-                  <a:alpha val="100000"/>
-                </a:srgbClr>
-              </a:solidFill>
-              <a:prstDash val="solid"/>
-              <a:round/>
-            </a:ln>
-          </p:spPr>
-          <p:txBody>
-            <a:bodyPr/>
-            <a:lstStyle/>
-            <a:p/>
-          </p:txBody>
-        </p:sp>
-        <p:sp>
-          <p:nvSpPr>
-            <p:cNvPr id="73" name="pt72"/>
-            <p:cNvSpPr/>
-            <p:nvPr/>
-          </p:nvSpPr>
-          <p:spPr>
-            <a:xfrm>
-              <a:off x="3572178" y="3315838"/>
-              <a:ext cx="49651" cy="49651"/>
-            </a:xfrm>
-            <a:prstGeom prst="ellipse">
-              <a:avLst/>
-            </a:prstGeom>
-            <a:solidFill>
-              <a:srgbClr val="F8766D">
-                <a:alpha val="100000"/>
-              </a:srgbClr>
-            </a:solidFill>
-            <a:ln w="9000" cap="rnd">
-              <a:solidFill>
-                <a:srgbClr val="F8766D">
-                  <a:alpha val="100000"/>
-                </a:srgbClr>
-              </a:solidFill>
-              <a:prstDash val="solid"/>
-              <a:round/>
-            </a:ln>
-          </p:spPr>
-          <p:txBody>
-            <a:bodyPr/>
-            <a:lstStyle/>
-            <a:p/>
-          </p:txBody>
-        </p:sp>
-        <p:sp>
-          <p:nvSpPr>
-            <p:cNvPr id="74" name="pt73"/>
-            <p:cNvSpPr/>
-            <p:nvPr/>
-          </p:nvSpPr>
-          <p:spPr>
-            <a:xfrm>
-              <a:off x="3642902" y="3276963"/>
-              <a:ext cx="49651" cy="49651"/>
-            </a:xfrm>
-            <a:prstGeom prst="ellipse">
-              <a:avLst/>
-            </a:prstGeom>
-            <a:solidFill>
-              <a:srgbClr val="F8766D">
-                <a:alpha val="100000"/>
-              </a:srgbClr>
-            </a:solidFill>
-            <a:ln w="9000" cap="rnd">
-              <a:solidFill>
-                <a:srgbClr val="F8766D">
-                  <a:alpha val="100000"/>
-                </a:srgbClr>
-              </a:solidFill>
-              <a:prstDash val="solid"/>
-              <a:round/>
-            </a:ln>
-          </p:spPr>
-          <p:txBody>
-            <a:bodyPr/>
-            <a:lstStyle/>
-            <a:p/>
-          </p:txBody>
-        </p:sp>
-        <p:sp>
-          <p:nvSpPr>
-            <p:cNvPr id="75" name="pt74"/>
-            <p:cNvSpPr/>
-            <p:nvPr/>
-          </p:nvSpPr>
-          <p:spPr>
-            <a:xfrm>
-              <a:off x="3713625" y="3079613"/>
-              <a:ext cx="49651" cy="49651"/>
-            </a:xfrm>
-            <a:prstGeom prst="ellipse">
-              <a:avLst/>
-            </a:prstGeom>
-            <a:solidFill>
-              <a:srgbClr val="F8766D">
-                <a:alpha val="100000"/>
-              </a:srgbClr>
-            </a:solidFill>
-            <a:ln w="9000" cap="rnd">
-              <a:solidFill>
-                <a:srgbClr val="F8766D">
-                  <a:alpha val="100000"/>
-                </a:srgbClr>
-              </a:solidFill>
-              <a:prstDash val="solid"/>
-              <a:round/>
-            </a:ln>
-          </p:spPr>
-          <p:txBody>
-            <a:bodyPr/>
-            <a:lstStyle/>
-            <a:p/>
-          </p:txBody>
-        </p:sp>
-        <p:sp>
-          <p:nvSpPr>
-            <p:cNvPr id="76" name="pt75"/>
-            <p:cNvSpPr/>
-            <p:nvPr/>
-          </p:nvSpPr>
-          <p:spPr>
-            <a:xfrm>
-              <a:off x="3784349" y="2746356"/>
-              <a:ext cx="49651" cy="49651"/>
-            </a:xfrm>
-            <a:prstGeom prst="ellipse">
-              <a:avLst/>
-            </a:prstGeom>
-            <a:solidFill>
-              <a:srgbClr val="F8766D">
-                <a:alpha val="100000"/>
-              </a:srgbClr>
-            </a:solidFill>
-            <a:ln w="9000" cap="rnd">
-              <a:solidFill>
-                <a:srgbClr val="F8766D">
-                  <a:alpha val="100000"/>
-                </a:srgbClr>
-              </a:solidFill>
-              <a:prstDash val="solid"/>
-              <a:round/>
-            </a:ln>
-          </p:spPr>
-          <p:txBody>
-            <a:bodyPr/>
-            <a:lstStyle/>
-            <a:p/>
-          </p:txBody>
-        </p:sp>
-        <p:sp>
-          <p:nvSpPr>
-            <p:cNvPr id="77" name="pt76"/>
-            <p:cNvSpPr/>
-            <p:nvPr/>
-          </p:nvSpPr>
-          <p:spPr>
-            <a:xfrm>
-              <a:off x="3855072" y="2375320"/>
-              <a:ext cx="49651" cy="49651"/>
-            </a:xfrm>
-            <a:prstGeom prst="ellipse">
-              <a:avLst/>
-            </a:prstGeom>
-            <a:solidFill>
-              <a:srgbClr val="F8766D">
-                <a:alpha val="100000"/>
-              </a:srgbClr>
-            </a:solidFill>
-            <a:ln w="9000" cap="rnd">
-              <a:solidFill>
-                <a:srgbClr val="F8766D">
-                  <a:alpha val="100000"/>
-                </a:srgbClr>
-              </a:solidFill>
-              <a:prstDash val="solid"/>
-              <a:round/>
-            </a:ln>
-          </p:spPr>
-          <p:txBody>
-            <a:bodyPr/>
-            <a:lstStyle/>
-            <a:p/>
-          </p:txBody>
-        </p:sp>
-        <p:sp>
-          <p:nvSpPr>
-            <p:cNvPr id="78" name="pt77"/>
-            <p:cNvSpPr/>
-            <p:nvPr/>
-          </p:nvSpPr>
-          <p:spPr>
-            <a:xfrm>
-              <a:off x="3925796" y="1942530"/>
-              <a:ext cx="49651" cy="49651"/>
-            </a:xfrm>
-            <a:prstGeom prst="ellipse">
-              <a:avLst/>
-            </a:prstGeom>
-            <a:solidFill>
-              <a:srgbClr val="F8766D">
-                <a:alpha val="100000"/>
-              </a:srgbClr>
-            </a:solidFill>
-            <a:ln w="9000" cap="rnd">
-              <a:solidFill>
-                <a:srgbClr val="F8766D">
-                  <a:alpha val="100000"/>
-                </a:srgbClr>
-              </a:solidFill>
-              <a:prstDash val="solid"/>
-              <a:round/>
-            </a:ln>
-          </p:spPr>
-          <p:txBody>
-            <a:bodyPr/>
-            <a:lstStyle/>
-            <a:p/>
-          </p:txBody>
-        </p:sp>
-        <p:sp>
-          <p:nvSpPr>
-            <p:cNvPr id="79" name="pt78"/>
-            <p:cNvSpPr/>
-            <p:nvPr/>
-          </p:nvSpPr>
-          <p:spPr>
-            <a:xfrm>
-              <a:off x="3996519" y="1608039"/>
-              <a:ext cx="49651" cy="49651"/>
-            </a:xfrm>
-            <a:prstGeom prst="ellipse">
-              <a:avLst/>
-            </a:prstGeom>
-            <a:solidFill>
-              <a:srgbClr val="F8766D">
-                <a:alpha val="100000"/>
-              </a:srgbClr>
-            </a:solidFill>
-            <a:ln w="9000" cap="rnd">
-              <a:solidFill>
-                <a:srgbClr val="F8766D">
-                  <a:alpha val="100000"/>
-                </a:srgbClr>
-              </a:solidFill>
-              <a:prstDash val="solid"/>
-              <a:round/>
-            </a:ln>
-          </p:spPr>
-          <p:txBody>
-            <a:bodyPr/>
-            <a:lstStyle/>
-            <a:p/>
-          </p:txBody>
-        </p:sp>
-        <p:sp>
-          <p:nvSpPr>
-            <p:cNvPr id="80" name="pt79"/>
-            <p:cNvSpPr/>
-            <p:nvPr/>
-          </p:nvSpPr>
-          <p:spPr>
-            <a:xfrm>
-              <a:off x="4067243" y="1310157"/>
-              <a:ext cx="49651" cy="49651"/>
-            </a:xfrm>
-            <a:prstGeom prst="ellipse">
-              <a:avLst/>
-            </a:prstGeom>
-            <a:solidFill>
-              <a:srgbClr val="F8766D">
-                <a:alpha val="100000"/>
-              </a:srgbClr>
-            </a:solidFill>
-            <a:ln w="9000" cap="rnd">
-              <a:solidFill>
-                <a:srgbClr val="F8766D">
-                  <a:alpha val="100000"/>
-                </a:srgbClr>
-              </a:solidFill>
-              <a:prstDash val="solid"/>
-              <a:round/>
-            </a:ln>
-          </p:spPr>
-          <p:txBody>
-            <a:bodyPr/>
-            <a:lstStyle/>
-            <a:p/>
-          </p:txBody>
-        </p:sp>
-        <p:sp>
-          <p:nvSpPr>
-            <p:cNvPr id="81" name="pt80"/>
-            <p:cNvSpPr/>
-            <p:nvPr/>
-          </p:nvSpPr>
-          <p:spPr>
-            <a:xfrm>
-              <a:off x="4137967" y="1103952"/>
-              <a:ext cx="49651" cy="49651"/>
-            </a:xfrm>
-            <a:prstGeom prst="ellipse">
-              <a:avLst/>
-            </a:prstGeom>
-            <a:solidFill>
-              <a:srgbClr val="F8766D">
-                <a:alpha val="100000"/>
-              </a:srgbClr>
-            </a:solidFill>
-            <a:ln w="9000" cap="rnd">
-              <a:solidFill>
-                <a:srgbClr val="F8766D">
-                  <a:alpha val="100000"/>
-                </a:srgbClr>
-              </a:solidFill>
-              <a:prstDash val="solid"/>
-              <a:round/>
-            </a:ln>
-          </p:spPr>
-          <p:txBody>
-            <a:bodyPr/>
-            <a:lstStyle/>
-            <a:p/>
-          </p:txBody>
-        </p:sp>
-        <p:sp>
-          <p:nvSpPr>
-            <p:cNvPr id="82" name="pt81"/>
-            <p:cNvSpPr/>
-            <p:nvPr/>
-          </p:nvSpPr>
-          <p:spPr>
-            <a:xfrm>
-              <a:off x="4208690" y="1511243"/>
-              <a:ext cx="49651" cy="49651"/>
-            </a:xfrm>
-            <a:prstGeom prst="ellipse">
-              <a:avLst/>
-            </a:prstGeom>
-            <a:solidFill>
-              <a:srgbClr val="F8766D">
-                <a:alpha val="100000"/>
-              </a:srgbClr>
-            </a:solidFill>
-            <a:ln w="9000" cap="rnd">
-              <a:solidFill>
-                <a:srgbClr val="F8766D">
-                  <a:alpha val="100000"/>
-                </a:srgbClr>
-              </a:solidFill>
-              <a:prstDash val="solid"/>
-              <a:round/>
-            </a:ln>
-          </p:spPr>
-          <p:txBody>
-            <a:bodyPr/>
-            <a:lstStyle/>
-            <a:p/>
-          </p:txBody>
-        </p:sp>
-        <p:sp>
-          <p:nvSpPr>
-            <p:cNvPr id="83" name="pt82"/>
-            <p:cNvSpPr/>
-            <p:nvPr/>
-          </p:nvSpPr>
-          <p:spPr>
-            <a:xfrm>
-              <a:off x="4279414" y="2089222"/>
-              <a:ext cx="49651" cy="49651"/>
-            </a:xfrm>
-            <a:prstGeom prst="ellipse">
-              <a:avLst/>
-            </a:prstGeom>
-            <a:solidFill>
-              <a:srgbClr val="F8766D">
-                <a:alpha val="100000"/>
-              </a:srgbClr>
-            </a:solidFill>
-            <a:ln w="9000" cap="rnd">
-              <a:solidFill>
-                <a:srgbClr val="F8766D">
-                  <a:alpha val="100000"/>
-                </a:srgbClr>
-              </a:solidFill>
-              <a:prstDash val="solid"/>
-              <a:round/>
-            </a:ln>
-          </p:spPr>
-          <p:txBody>
-            <a:bodyPr/>
-            <a:lstStyle/>
-            <a:p/>
-          </p:txBody>
-        </p:sp>
-        <p:sp>
-          <p:nvSpPr>
-            <p:cNvPr id="84" name="pt83"/>
-            <p:cNvSpPr/>
-            <p:nvPr/>
-          </p:nvSpPr>
-          <p:spPr>
-            <a:xfrm>
-              <a:off x="4350137" y="2427593"/>
-              <a:ext cx="49651" cy="49651"/>
-            </a:xfrm>
-            <a:prstGeom prst="ellipse">
-              <a:avLst/>
-            </a:prstGeom>
-            <a:solidFill>
-              <a:srgbClr val="F8766D">
-                <a:alpha val="100000"/>
-              </a:srgbClr>
-            </a:solidFill>
-            <a:ln w="9000" cap="rnd">
-              <a:solidFill>
-                <a:srgbClr val="F8766D">
-                  <a:alpha val="100000"/>
-                </a:srgbClr>
-              </a:solidFill>
-              <a:prstDash val="solid"/>
-              <a:round/>
-            </a:ln>
-          </p:spPr>
-          <p:txBody>
-            <a:bodyPr/>
-            <a:lstStyle/>
-            <a:p/>
-          </p:txBody>
-        </p:sp>
-        <p:sp>
-          <p:nvSpPr>
-            <p:cNvPr id="85" name="pt84"/>
-            <p:cNvSpPr/>
-            <p:nvPr/>
-          </p:nvSpPr>
-          <p:spPr>
-            <a:xfrm>
-              <a:off x="4420861" y="2713729"/>
-              <a:ext cx="49651" cy="49651"/>
-            </a:xfrm>
-            <a:prstGeom prst="ellipse">
-              <a:avLst/>
-            </a:prstGeom>
-            <a:solidFill>
-              <a:srgbClr val="F8766D">
-                <a:alpha val="100000"/>
-              </a:srgbClr>
-            </a:solidFill>
-            <a:ln w="9000" cap="rnd">
-              <a:solidFill>
-                <a:srgbClr val="F8766D">
-                  <a:alpha val="100000"/>
-                </a:srgbClr>
-              </a:solidFill>
-              <a:prstDash val="solid"/>
-              <a:round/>
-            </a:ln>
-          </p:spPr>
-          <p:txBody>
-            <a:bodyPr/>
-            <a:lstStyle/>
-            <a:p/>
-          </p:txBody>
-        </p:sp>
-        <p:sp>
-          <p:nvSpPr>
-            <p:cNvPr id="86" name="pt85"/>
-            <p:cNvSpPr/>
-            <p:nvPr/>
-          </p:nvSpPr>
-          <p:spPr>
-            <a:xfrm>
-              <a:off x="4491584" y="3037251"/>
-              <a:ext cx="49651" cy="49651"/>
-            </a:xfrm>
-            <a:prstGeom prst="ellipse">
-              <a:avLst/>
-            </a:prstGeom>
-            <a:solidFill>
-              <a:srgbClr val="F8766D">
-                <a:alpha val="100000"/>
-              </a:srgbClr>
-            </a:solidFill>
-            <a:ln w="9000" cap="rnd">
-              <a:solidFill>
-                <a:srgbClr val="F8766D">
-                  <a:alpha val="100000"/>
-                </a:srgbClr>
-              </a:solidFill>
-              <a:prstDash val="solid"/>
-              <a:round/>
-            </a:ln>
-          </p:spPr>
-          <p:txBody>
-            <a:bodyPr/>
-            <a:lstStyle/>
-            <a:p/>
-          </p:txBody>
-        </p:sp>
-        <p:sp>
-          <p:nvSpPr>
-            <p:cNvPr id="87" name="pt86"/>
-            <p:cNvSpPr/>
-            <p:nvPr/>
-          </p:nvSpPr>
-          <p:spPr>
-            <a:xfrm>
-              <a:off x="4562308" y="3186058"/>
-              <a:ext cx="49651" cy="49651"/>
-            </a:xfrm>
-            <a:prstGeom prst="ellipse">
-              <a:avLst/>
-            </a:prstGeom>
-            <a:solidFill>
-              <a:srgbClr val="F8766D">
-                <a:alpha val="100000"/>
-              </a:srgbClr>
-            </a:solidFill>
-            <a:ln w="9000" cap="rnd">
-              <a:solidFill>
-                <a:srgbClr val="F8766D">
-                  <a:alpha val="100000"/>
-                </a:srgbClr>
-              </a:solidFill>
-              <a:prstDash val="solid"/>
-              <a:round/>
-            </a:ln>
-          </p:spPr>
-          <p:txBody>
-            <a:bodyPr/>
-            <a:lstStyle/>
-            <a:p/>
-          </p:txBody>
-        </p:sp>
-        <p:sp>
-          <p:nvSpPr>
-            <p:cNvPr id="88" name="pt87"/>
-            <p:cNvSpPr/>
-            <p:nvPr/>
-          </p:nvSpPr>
-          <p:spPr>
-            <a:xfrm>
-              <a:off x="4633031" y="3150753"/>
-              <a:ext cx="49651" cy="49651"/>
-            </a:xfrm>
-            <a:prstGeom prst="ellipse">
-              <a:avLst/>
-            </a:prstGeom>
-            <a:solidFill>
-              <a:srgbClr val="F8766D">
-                <a:alpha val="100000"/>
-              </a:srgbClr>
-            </a:solidFill>
-            <a:ln w="9000" cap="rnd">
-              <a:solidFill>
-                <a:srgbClr val="F8766D">
-                  <a:alpha val="100000"/>
-                </a:srgbClr>
-              </a:solidFill>
-              <a:prstDash val="solid"/>
-              <a:round/>
-            </a:ln>
-          </p:spPr>
-          <p:txBody>
-            <a:bodyPr/>
-            <a:lstStyle/>
-            <a:p/>
-          </p:txBody>
-        </p:sp>
-        <p:sp>
-          <p:nvSpPr>
-            <p:cNvPr id="89" name="pt88"/>
-            <p:cNvSpPr/>
-            <p:nvPr/>
-          </p:nvSpPr>
-          <p:spPr>
-            <a:xfrm>
-              <a:off x="4703755" y="2997333"/>
-              <a:ext cx="49651" cy="49651"/>
-            </a:xfrm>
-            <a:prstGeom prst="ellipse">
-              <a:avLst/>
-            </a:prstGeom>
-            <a:solidFill>
-              <a:srgbClr val="F8766D">
-                <a:alpha val="100000"/>
-              </a:srgbClr>
-            </a:solidFill>
-            <a:ln w="9000" cap="rnd">
-              <a:solidFill>
-                <a:srgbClr val="F8766D">
-                  <a:alpha val="100000"/>
-                </a:srgbClr>
-              </a:solidFill>
-              <a:prstDash val="solid"/>
-              <a:round/>
-            </a:ln>
-          </p:spPr>
-          <p:txBody>
-            <a:bodyPr/>
-            <a:lstStyle/>
-            <a:p/>
-          </p:txBody>
-        </p:sp>
-        <p:sp>
-          <p:nvSpPr>
-            <p:cNvPr id="90" name="pt89"/>
-            <p:cNvSpPr/>
-            <p:nvPr/>
-          </p:nvSpPr>
-          <p:spPr>
-            <a:xfrm>
-              <a:off x="4774478" y="2714497"/>
-              <a:ext cx="49651" cy="49651"/>
-            </a:xfrm>
-            <a:prstGeom prst="ellipse">
-              <a:avLst/>
-            </a:prstGeom>
-            <a:solidFill>
-              <a:srgbClr val="F8766D">
-                <a:alpha val="100000"/>
-              </a:srgbClr>
-            </a:solidFill>
-            <a:ln w="9000" cap="rnd">
-              <a:solidFill>
-                <a:srgbClr val="F8766D">
-                  <a:alpha val="100000"/>
-                </a:srgbClr>
-              </a:solidFill>
-              <a:prstDash val="solid"/>
-              <a:round/>
-            </a:ln>
-          </p:spPr>
-          <p:txBody>
-            <a:bodyPr/>
-            <a:lstStyle/>
-            <a:p/>
-          </p:txBody>
-        </p:sp>
-        <p:sp>
-          <p:nvSpPr>
-            <p:cNvPr id="91" name="pt90"/>
-            <p:cNvSpPr/>
-            <p:nvPr/>
-          </p:nvSpPr>
-          <p:spPr>
-            <a:xfrm>
-              <a:off x="4845202" y="2528031"/>
-              <a:ext cx="49651" cy="49651"/>
-            </a:xfrm>
-            <a:prstGeom prst="ellipse">
-              <a:avLst/>
-            </a:prstGeom>
-            <a:solidFill>
-              <a:srgbClr val="F8766D">
-                <a:alpha val="100000"/>
-              </a:srgbClr>
-            </a:solidFill>
-            <a:ln w="9000" cap="rnd">
-              <a:solidFill>
-                <a:srgbClr val="F8766D">
-                  <a:alpha val="100000"/>
-                </a:srgbClr>
-              </a:solidFill>
-              <a:prstDash val="solid"/>
-              <a:round/>
-            </a:ln>
-          </p:spPr>
-          <p:txBody>
-            <a:bodyPr/>
-            <a:lstStyle/>
-            <a:p/>
-          </p:txBody>
-        </p:sp>
-        <p:sp>
-          <p:nvSpPr>
-            <p:cNvPr id="92" name="pt91"/>
-            <p:cNvSpPr/>
-            <p:nvPr/>
-          </p:nvSpPr>
-          <p:spPr>
-            <a:xfrm>
-              <a:off x="4915925" y="2375285"/>
-              <a:ext cx="49651" cy="49651"/>
-            </a:xfrm>
-            <a:prstGeom prst="ellipse">
-              <a:avLst/>
-            </a:prstGeom>
-            <a:solidFill>
-              <a:srgbClr val="F8766D">
-                <a:alpha val="100000"/>
-              </a:srgbClr>
-            </a:solidFill>
-            <a:ln w="9000" cap="rnd">
-              <a:solidFill>
-                <a:srgbClr val="F8766D">
-                  <a:alpha val="100000"/>
-                </a:srgbClr>
-              </a:solidFill>
-              <a:prstDash val="solid"/>
-              <a:round/>
-            </a:ln>
-          </p:spPr>
-          <p:txBody>
-            <a:bodyPr/>
-            <a:lstStyle/>
-            <a:p/>
-          </p:txBody>
-        </p:sp>
-        <p:sp>
-          <p:nvSpPr>
-            <p:cNvPr id="93" name="pt92"/>
-            <p:cNvSpPr/>
-            <p:nvPr/>
-          </p:nvSpPr>
-          <p:spPr>
-            <a:xfrm>
-              <a:off x="4986649" y="2528220"/>
-              <a:ext cx="49651" cy="49651"/>
-            </a:xfrm>
-            <a:prstGeom prst="ellipse">
-              <a:avLst/>
-            </a:prstGeom>
-            <a:solidFill>
-              <a:srgbClr val="F8766D">
-                <a:alpha val="100000"/>
-              </a:srgbClr>
-            </a:solidFill>
-            <a:ln w="9000" cap="rnd">
-              <a:solidFill>
-                <a:srgbClr val="F8766D">
-                  <a:alpha val="100000"/>
-                </a:srgbClr>
-              </a:solidFill>
-              <a:prstDash val="solid"/>
-              <a:round/>
-            </a:ln>
-          </p:spPr>
-          <p:txBody>
-            <a:bodyPr/>
-            <a:lstStyle/>
-            <a:p/>
-          </p:txBody>
-        </p:sp>
-        <p:sp>
-          <p:nvSpPr>
-            <p:cNvPr id="94" name="pt93"/>
-            <p:cNvSpPr/>
-            <p:nvPr/>
-          </p:nvSpPr>
-          <p:spPr>
-            <a:xfrm>
-              <a:off x="5057372" y="2809556"/>
-              <a:ext cx="49651" cy="49651"/>
-            </a:xfrm>
-            <a:prstGeom prst="ellipse">
-              <a:avLst/>
-            </a:prstGeom>
-            <a:solidFill>
-              <a:srgbClr val="F8766D">
-                <a:alpha val="100000"/>
-              </a:srgbClr>
-            </a:solidFill>
-            <a:ln w="9000" cap="rnd">
-              <a:solidFill>
-                <a:srgbClr val="F8766D">
-                  <a:alpha val="100000"/>
-                </a:srgbClr>
-              </a:solidFill>
-              <a:prstDash val="solid"/>
-              <a:round/>
-            </a:ln>
-          </p:spPr>
-          <p:txBody>
-            <a:bodyPr/>
-            <a:lstStyle/>
-            <a:p/>
-          </p:txBody>
-        </p:sp>
-        <p:sp>
-          <p:nvSpPr>
-            <p:cNvPr id="95" name="pt94"/>
-            <p:cNvSpPr/>
-            <p:nvPr/>
-          </p:nvSpPr>
-          <p:spPr>
-            <a:xfrm>
-              <a:off x="5128096" y="3260761"/>
-              <a:ext cx="49651" cy="49651"/>
-            </a:xfrm>
-            <a:prstGeom prst="ellipse">
-              <a:avLst/>
-            </a:prstGeom>
-            <a:solidFill>
-              <a:srgbClr val="F8766D">
-                <a:alpha val="100000"/>
-              </a:srgbClr>
-            </a:solidFill>
-            <a:ln w="9000" cap="rnd">
-              <a:solidFill>
-                <a:srgbClr val="F8766D">
-                  <a:alpha val="100000"/>
-                </a:srgbClr>
-              </a:solidFill>
-              <a:prstDash val="solid"/>
-              <a:round/>
-            </a:ln>
-          </p:spPr>
-          <p:txBody>
-            <a:bodyPr/>
-            <a:lstStyle/>
-            <a:p/>
-          </p:txBody>
-        </p:sp>
-        <p:sp>
-          <p:nvSpPr>
-            <p:cNvPr id="96" name="pt95"/>
-            <p:cNvSpPr/>
-            <p:nvPr/>
-          </p:nvSpPr>
-          <p:spPr>
-            <a:xfrm>
-              <a:off x="5198819" y="3547107"/>
-              <a:ext cx="49651" cy="49651"/>
-            </a:xfrm>
-            <a:prstGeom prst="ellipse">
-              <a:avLst/>
-            </a:prstGeom>
-            <a:solidFill>
-              <a:srgbClr val="F8766D">
-                <a:alpha val="100000"/>
-              </a:srgbClr>
-            </a:solidFill>
-            <a:ln w="9000" cap="rnd">
-              <a:solidFill>
-                <a:srgbClr val="F8766D">
-                  <a:alpha val="100000"/>
-                </a:srgbClr>
-              </a:solidFill>
-              <a:prstDash val="solid"/>
-              <a:round/>
-            </a:ln>
-          </p:spPr>
-          <p:txBody>
-            <a:bodyPr/>
-            <a:lstStyle/>
-            <a:p/>
-          </p:txBody>
-        </p:sp>
-        <p:sp>
-          <p:nvSpPr>
-            <p:cNvPr id="97" name="pt96"/>
-            <p:cNvSpPr/>
-            <p:nvPr/>
-          </p:nvSpPr>
-          <p:spPr>
-            <a:xfrm>
-              <a:off x="5269543" y="3725776"/>
-              <a:ext cx="49651" cy="49651"/>
-            </a:xfrm>
-            <a:prstGeom prst="ellipse">
-              <a:avLst/>
-            </a:prstGeom>
-            <a:solidFill>
-              <a:srgbClr val="F8766D">
-                <a:alpha val="100000"/>
-              </a:srgbClr>
-            </a:solidFill>
-            <a:ln w="9000" cap="rnd">
-              <a:solidFill>
-                <a:srgbClr val="F8766D">
-                  <a:alpha val="100000"/>
-                </a:srgbClr>
-              </a:solidFill>
-              <a:prstDash val="solid"/>
-              <a:round/>
-            </a:ln>
-          </p:spPr>
-          <p:txBody>
-            <a:bodyPr/>
-            <a:lstStyle/>
-            <a:p/>
-          </p:txBody>
-        </p:sp>
-        <p:sp>
-          <p:nvSpPr>
-            <p:cNvPr id="98" name="pt97"/>
-            <p:cNvSpPr/>
-            <p:nvPr/>
-          </p:nvSpPr>
-          <p:spPr>
-            <a:xfrm>
-              <a:off x="5340266" y="3813041"/>
-              <a:ext cx="49651" cy="49651"/>
-            </a:xfrm>
-            <a:prstGeom prst="ellipse">
-              <a:avLst/>
-            </a:prstGeom>
-            <a:solidFill>
-              <a:srgbClr val="F8766D">
-                <a:alpha val="100000"/>
-              </a:srgbClr>
-            </a:solidFill>
-            <a:ln w="9000" cap="rnd">
-              <a:solidFill>
-                <a:srgbClr val="F8766D">
-                  <a:alpha val="100000"/>
-                </a:srgbClr>
-              </a:solidFill>
-              <a:prstDash val="solid"/>
-              <a:round/>
-            </a:ln>
-          </p:spPr>
-          <p:txBody>
-            <a:bodyPr/>
-            <a:lstStyle/>
-            <a:p/>
-          </p:txBody>
-        </p:sp>
-        <p:sp>
-          <p:nvSpPr>
-            <p:cNvPr id="99" name="pt98"/>
-            <p:cNvSpPr/>
-            <p:nvPr/>
-          </p:nvSpPr>
-          <p:spPr>
-            <a:xfrm>
-              <a:off x="5410990" y="3867834"/>
-              <a:ext cx="49651" cy="49651"/>
-            </a:xfrm>
-            <a:prstGeom prst="ellipse">
-              <a:avLst/>
-            </a:prstGeom>
-            <a:solidFill>
-              <a:srgbClr val="F8766D">
-                <a:alpha val="100000"/>
-              </a:srgbClr>
-            </a:solidFill>
-            <a:ln w="9000" cap="rnd">
-              <a:solidFill>
-                <a:srgbClr val="F8766D">
-                  <a:alpha val="100000"/>
-                </a:srgbClr>
-              </a:solidFill>
-              <a:prstDash val="solid"/>
-              <a:round/>
-            </a:ln>
-          </p:spPr>
-          <p:txBody>
-            <a:bodyPr/>
-            <a:lstStyle/>
-            <a:p/>
-          </p:txBody>
-        </p:sp>
-        <p:sp>
-          <p:nvSpPr>
-            <p:cNvPr id="100" name="tx99"/>
-            <p:cNvSpPr/>
-            <p:nvPr/>
-          </p:nvSpPr>
-          <p:spPr>
-            <a:xfrm>
-              <a:off x="1149684" y="3980782"/>
+            <p:cNvPr id="70" name="tx69"/>
+            <p:cNvSpPr/>
+            <p:nvPr/>
+          </p:nvSpPr>
+          <p:spPr>
+            <a:xfrm>
+              <a:off x="1149684" y="3995952"/>
               <a:ext cx="248840" cy="84529"/>
             </a:xfrm>
             <a:prstGeom prst="rect">
@@ -6119,13 +4974,13 @@
         </p:sp>
         <p:sp>
           <p:nvSpPr>
-            <p:cNvPr id="101" name="tx100"/>
-            <p:cNvSpPr/>
-            <p:nvPr/>
-          </p:nvSpPr>
-          <p:spPr>
-            <a:xfrm>
-              <a:off x="1149684" y="3134342"/>
+            <p:cNvPr id="71" name="tx70"/>
+            <p:cNvSpPr/>
+            <p:nvPr/>
+          </p:nvSpPr>
+          <p:spPr>
+            <a:xfrm>
+              <a:off x="1149684" y="3029825"/>
               <a:ext cx="248840" cy="84529"/>
             </a:xfrm>
             <a:prstGeom prst="rect">
@@ -6165,13 +5020,13 @@
         </p:sp>
         <p:sp>
           <p:nvSpPr>
-            <p:cNvPr id="102" name="tx101"/>
-            <p:cNvSpPr/>
-            <p:nvPr/>
-          </p:nvSpPr>
-          <p:spPr>
-            <a:xfrm>
-              <a:off x="1149684" y="2287901"/>
+            <p:cNvPr id="72" name="tx71"/>
+            <p:cNvSpPr/>
+            <p:nvPr/>
+          </p:nvSpPr>
+          <p:spPr>
+            <a:xfrm>
+              <a:off x="1149684" y="2063698"/>
               <a:ext cx="248840" cy="84529"/>
             </a:xfrm>
             <a:prstGeom prst="rect">
@@ -6211,13 +5066,13 @@
         </p:sp>
         <p:sp>
           <p:nvSpPr>
-            <p:cNvPr id="103" name="tx102"/>
-            <p:cNvSpPr/>
-            <p:nvPr/>
-          </p:nvSpPr>
-          <p:spPr>
-            <a:xfrm>
-              <a:off x="1149684" y="1441460"/>
+            <p:cNvPr id="73" name="tx72"/>
+            <p:cNvSpPr/>
+            <p:nvPr/>
+          </p:nvSpPr>
+          <p:spPr>
+            <a:xfrm>
+              <a:off x="1149684" y="1097570"/>
               <a:ext cx="248840" cy="84529"/>
             </a:xfrm>
             <a:prstGeom prst="rect">
@@ -6257,13 +5112,13 @@
         </p:sp>
         <p:sp>
           <p:nvSpPr>
-            <p:cNvPr id="104" name="pl103"/>
-            <p:cNvSpPr/>
-            <p:nvPr/>
-          </p:nvSpPr>
-          <p:spPr>
-            <a:xfrm>
-              <a:off x="1426360" y="4024575"/>
+            <p:cNvPr id="74" name="pl73"/>
+            <p:cNvSpPr/>
+            <p:nvPr/>
+          </p:nvSpPr>
+          <p:spPr>
+            <a:xfrm>
+              <a:off x="1426360" y="4039744"/>
               <a:ext cx="34794" cy="0"/>
             </a:xfrm>
             <a:custGeom>
@@ -6297,13 +5152,13 @@
         </p:sp>
         <p:sp>
           <p:nvSpPr>
-            <p:cNvPr id="105" name="pl104"/>
-            <p:cNvSpPr/>
-            <p:nvPr/>
-          </p:nvSpPr>
-          <p:spPr>
-            <a:xfrm>
-              <a:off x="1426360" y="3178134"/>
+            <p:cNvPr id="75" name="pl74"/>
+            <p:cNvSpPr/>
+            <p:nvPr/>
+          </p:nvSpPr>
+          <p:spPr>
+            <a:xfrm>
+              <a:off x="1426360" y="3073617"/>
               <a:ext cx="34794" cy="0"/>
             </a:xfrm>
             <a:custGeom>
@@ -6337,13 +5192,13 @@
         </p:sp>
         <p:sp>
           <p:nvSpPr>
-            <p:cNvPr id="106" name="pl105"/>
-            <p:cNvSpPr/>
-            <p:nvPr/>
-          </p:nvSpPr>
-          <p:spPr>
-            <a:xfrm>
-              <a:off x="1426360" y="2331694"/>
+            <p:cNvPr id="76" name="pl75"/>
+            <p:cNvSpPr/>
+            <p:nvPr/>
+          </p:nvSpPr>
+          <p:spPr>
+            <a:xfrm>
+              <a:off x="1426360" y="2107490"/>
               <a:ext cx="34794" cy="0"/>
             </a:xfrm>
             <a:custGeom>
@@ -6377,13 +5232,13 @@
         </p:sp>
         <p:sp>
           <p:nvSpPr>
-            <p:cNvPr id="107" name="pl106"/>
-            <p:cNvSpPr/>
-            <p:nvPr/>
-          </p:nvSpPr>
-          <p:spPr>
-            <a:xfrm>
-              <a:off x="1426360" y="1485253"/>
+            <p:cNvPr id="77" name="pl76"/>
+            <p:cNvSpPr/>
+            <p:nvPr/>
+          </p:nvSpPr>
+          <p:spPr>
+            <a:xfrm>
+              <a:off x="1426360" y="1141363"/>
               <a:ext cx="34794" cy="0"/>
             </a:xfrm>
             <a:custGeom>
@@ -6417,7 +5272,7 @@
         </p:sp>
         <p:sp>
           <p:nvSpPr>
-            <p:cNvPr id="108" name="pl107"/>
+            <p:cNvPr id="78" name="pl77"/>
             <p:cNvSpPr/>
             <p:nvPr/>
           </p:nvSpPr>
@@ -6457,7 +5312,7 @@
         </p:sp>
         <p:sp>
           <p:nvSpPr>
-            <p:cNvPr id="109" name="pl108"/>
+            <p:cNvPr id="79" name="pl78"/>
             <p:cNvSpPr/>
             <p:nvPr/>
           </p:nvSpPr>
@@ -6497,7 +5352,7 @@
         </p:sp>
         <p:sp>
           <p:nvSpPr>
-            <p:cNvPr id="110" name="pl109"/>
+            <p:cNvPr id="80" name="pl79"/>
             <p:cNvSpPr/>
             <p:nvPr/>
           </p:nvSpPr>
@@ -6537,7 +5392,7 @@
         </p:sp>
         <p:sp>
           <p:nvSpPr>
-            <p:cNvPr id="111" name="pl110"/>
+            <p:cNvPr id="81" name="pl80"/>
             <p:cNvSpPr/>
             <p:nvPr/>
           </p:nvSpPr>
@@ -6577,7 +5432,7 @@
         </p:sp>
         <p:sp>
           <p:nvSpPr>
-            <p:cNvPr id="112" name="pl111"/>
+            <p:cNvPr id="82" name="pl81"/>
             <p:cNvSpPr/>
             <p:nvPr/>
           </p:nvSpPr>
@@ -6617,7 +5472,7 @@
         </p:sp>
         <p:sp>
           <p:nvSpPr>
-            <p:cNvPr id="113" name="pl112"/>
+            <p:cNvPr id="83" name="pl82"/>
             <p:cNvSpPr/>
             <p:nvPr/>
           </p:nvSpPr>
@@ -6657,7 +5512,7 @@
         </p:sp>
         <p:sp>
           <p:nvSpPr>
-            <p:cNvPr id="114" name="pl113"/>
+            <p:cNvPr id="84" name="pl83"/>
             <p:cNvSpPr/>
             <p:nvPr/>
           </p:nvSpPr>
@@ -6697,7 +5552,7 @@
         </p:sp>
         <p:sp>
           <p:nvSpPr>
-            <p:cNvPr id="115" name="pl114"/>
+            <p:cNvPr id="85" name="pl84"/>
             <p:cNvSpPr/>
             <p:nvPr/>
           </p:nvSpPr>
@@ -6737,7 +5592,7 @@
         </p:sp>
         <p:sp>
           <p:nvSpPr>
-            <p:cNvPr id="116" name="pl115"/>
+            <p:cNvPr id="86" name="pl85"/>
             <p:cNvSpPr/>
             <p:nvPr/>
           </p:nvSpPr>
@@ -6777,7 +5632,7 @@
         </p:sp>
         <p:sp>
           <p:nvSpPr>
-            <p:cNvPr id="117" name="pl116"/>
+            <p:cNvPr id="87" name="pl86"/>
             <p:cNvSpPr/>
             <p:nvPr/>
           </p:nvSpPr>
@@ -6817,7 +5672,7 @@
         </p:sp>
         <p:sp>
           <p:nvSpPr>
-            <p:cNvPr id="118" name="pl117"/>
+            <p:cNvPr id="88" name="pl87"/>
             <p:cNvSpPr/>
             <p:nvPr/>
           </p:nvSpPr>
@@ -6857,7 +5712,7 @@
         </p:sp>
         <p:sp>
           <p:nvSpPr>
-            <p:cNvPr id="119" name="pl118"/>
+            <p:cNvPr id="89" name="pl88"/>
             <p:cNvSpPr/>
             <p:nvPr/>
           </p:nvSpPr>
@@ -6897,7 +5752,7 @@
         </p:sp>
         <p:sp>
           <p:nvSpPr>
-            <p:cNvPr id="120" name="pl119"/>
+            <p:cNvPr id="90" name="pl89"/>
             <p:cNvSpPr/>
             <p:nvPr/>
           </p:nvSpPr>
@@ -6937,7 +5792,7 @@
         </p:sp>
         <p:sp>
           <p:nvSpPr>
-            <p:cNvPr id="121" name="pl120"/>
+            <p:cNvPr id="91" name="pl90"/>
             <p:cNvSpPr/>
             <p:nvPr/>
           </p:nvSpPr>
@@ -6977,7 +5832,7 @@
         </p:sp>
         <p:sp>
           <p:nvSpPr>
-            <p:cNvPr id="122" name="tx121"/>
+            <p:cNvPr id="92" name="tx91"/>
             <p:cNvSpPr/>
             <p:nvPr/>
           </p:nvSpPr>
@@ -7023,7 +5878,7 @@
         </p:sp>
         <p:sp>
           <p:nvSpPr>
-            <p:cNvPr id="123" name="tx122"/>
+            <p:cNvPr id="93" name="tx92"/>
             <p:cNvSpPr/>
             <p:nvPr/>
           </p:nvSpPr>
@@ -7069,7 +5924,7 @@
         </p:sp>
         <p:sp>
           <p:nvSpPr>
-            <p:cNvPr id="124" name="tx123"/>
+            <p:cNvPr id="94" name="tx93"/>
             <p:cNvSpPr/>
             <p:nvPr/>
           </p:nvSpPr>
@@ -7115,7 +5970,7 @@
         </p:sp>
         <p:sp>
           <p:nvSpPr>
-            <p:cNvPr id="125" name="tx124"/>
+            <p:cNvPr id="95" name="tx94"/>
             <p:cNvSpPr/>
             <p:nvPr/>
           </p:nvSpPr>
@@ -7161,7 +6016,7 @@
         </p:sp>
         <p:sp>
           <p:nvSpPr>
-            <p:cNvPr id="126" name="tx125"/>
+            <p:cNvPr id="96" name="tx95"/>
             <p:cNvSpPr/>
             <p:nvPr/>
           </p:nvSpPr>
@@ -7207,7 +6062,7 @@
         </p:sp>
         <p:sp>
           <p:nvSpPr>
-            <p:cNvPr id="127" name="tx126"/>
+            <p:cNvPr id="97" name="tx96"/>
             <p:cNvSpPr/>
             <p:nvPr/>
           </p:nvSpPr>
@@ -7253,7 +6108,7 @@
         </p:sp>
         <p:sp>
           <p:nvSpPr>
-            <p:cNvPr id="128" name="tx127"/>
+            <p:cNvPr id="98" name="tx97"/>
             <p:cNvSpPr/>
             <p:nvPr/>
           </p:nvSpPr>
@@ -7299,7 +6154,7 @@
         </p:sp>
         <p:sp>
           <p:nvSpPr>
-            <p:cNvPr id="129" name="tx128"/>
+            <p:cNvPr id="99" name="tx98"/>
             <p:cNvSpPr/>
             <p:nvPr/>
           </p:nvSpPr>
@@ -7345,7 +6200,7 @@
         </p:sp>
         <p:sp>
           <p:nvSpPr>
-            <p:cNvPr id="130" name="tx129"/>
+            <p:cNvPr id="100" name="tx99"/>
             <p:cNvSpPr/>
             <p:nvPr/>
           </p:nvSpPr>
@@ -7391,7 +6246,7 @@
         </p:sp>
         <p:sp>
           <p:nvSpPr>
-            <p:cNvPr id="131" name="tx130"/>
+            <p:cNvPr id="101" name="tx100"/>
             <p:cNvSpPr/>
             <p:nvPr/>
           </p:nvSpPr>
@@ -7437,7 +6292,7 @@
         </p:sp>
         <p:sp>
           <p:nvSpPr>
-            <p:cNvPr id="132" name="tx131"/>
+            <p:cNvPr id="102" name="tx101"/>
             <p:cNvSpPr/>
             <p:nvPr/>
           </p:nvSpPr>
@@ -7483,7 +6338,7 @@
         </p:sp>
         <p:sp>
           <p:nvSpPr>
-            <p:cNvPr id="133" name="tx132"/>
+            <p:cNvPr id="103" name="tx102"/>
             <p:cNvSpPr/>
             <p:nvPr/>
           </p:nvSpPr>
@@ -7529,7 +6384,7 @@
         </p:sp>
         <p:sp>
           <p:nvSpPr>
-            <p:cNvPr id="134" name="tx133"/>
+            <p:cNvPr id="104" name="tx103"/>
             <p:cNvSpPr/>
             <p:nvPr/>
           </p:nvSpPr>
@@ -7575,7 +6430,7 @@
         </p:sp>
         <p:sp>
           <p:nvSpPr>
-            <p:cNvPr id="135" name="tx134"/>
+            <p:cNvPr id="105" name="tx104"/>
             <p:cNvSpPr/>
             <p:nvPr/>
           </p:nvSpPr>
@@ -7621,7 +6476,7 @@
         </p:sp>
         <p:sp>
           <p:nvSpPr>
-            <p:cNvPr id="136" name="tx135"/>
+            <p:cNvPr id="106" name="tx105"/>
             <p:cNvSpPr/>
             <p:nvPr/>
           </p:nvSpPr>
@@ -7667,7 +6522,7 @@
         </p:sp>
         <p:sp>
           <p:nvSpPr>
-            <p:cNvPr id="137" name="tx136"/>
+            <p:cNvPr id="107" name="tx106"/>
             <p:cNvSpPr/>
             <p:nvPr/>
           </p:nvSpPr>
@@ -7713,7 +6568,7 @@
         </p:sp>
         <p:sp>
           <p:nvSpPr>
-            <p:cNvPr id="138" name="rc137"/>
+            <p:cNvPr id="108" name="rc107"/>
             <p:cNvSpPr/>
             <p:nvPr/>
           </p:nvSpPr>
@@ -7739,7 +6594,7 @@
         </p:sp>
         <p:sp>
           <p:nvSpPr>
-            <p:cNvPr id="139" name="tx138"/>
+            <p:cNvPr id="109" name="tx108"/>
             <p:cNvSpPr/>
             <p:nvPr/>
           </p:nvSpPr>
@@ -7785,7 +6640,7 @@
         </p:sp>
         <p:sp>
           <p:nvSpPr>
-            <p:cNvPr id="140" name="rc139"/>
+            <p:cNvPr id="110" name="rc109"/>
             <p:cNvSpPr/>
             <p:nvPr/>
           </p:nvSpPr>
@@ -7811,7 +6666,7 @@
         </p:sp>
         <p:sp>
           <p:nvSpPr>
-            <p:cNvPr id="141" name="pl140"/>
+            <p:cNvPr id="111" name="pl110"/>
             <p:cNvSpPr/>
             <p:nvPr/>
           </p:nvSpPr>
@@ -7851,7 +6706,7 @@
         </p:sp>
         <p:sp>
           <p:nvSpPr>
-            <p:cNvPr id="142" name="pt141"/>
+            <p:cNvPr id="112" name="pt111"/>
             <p:cNvSpPr/>
             <p:nvPr/>
           </p:nvSpPr>
@@ -7886,7 +6741,7 @@
         </p:sp>
         <p:sp>
           <p:nvSpPr>
-            <p:cNvPr id="143" name="tx142"/>
+            <p:cNvPr id="113" name="tx112"/>
             <p:cNvSpPr/>
             <p:nvPr/>
           </p:nvSpPr>

</xml_diff>

<commit_message>
Deploying to gh-pages from @ sean4andrew/safuncs@29ab9cd283a87402e9f98f233cfaf1ae838c13f0 🚀
</commit_message>
<xml_diff>
--- a/reference/plot_prefix-Hazard-Curve.pptx
+++ b/reference/plot_prefix-Hazard-Curve.pptx
@@ -2359,7 +2359,7 @@
           </p:nvSpPr>
           <p:spPr>
             <a:xfrm>
-              <a:off x="1461154" y="3556681"/>
+              <a:off x="1461154" y="3601355"/>
               <a:ext cx="4200976" cy="0"/>
             </a:xfrm>
             <a:custGeom>
@@ -2402,7 +2402,7 @@
           </p:nvSpPr>
           <p:spPr>
             <a:xfrm>
-              <a:off x="1461154" y="2590554"/>
+              <a:off x="1461154" y="2754914"/>
               <a:ext cx="4200976" cy="0"/>
             </a:xfrm>
             <a:custGeom>
@@ -2445,7 +2445,7 @@
           </p:nvSpPr>
           <p:spPr>
             <a:xfrm>
-              <a:off x="1461154" y="1624427"/>
+              <a:off x="1461154" y="1908473"/>
               <a:ext cx="4200976" cy="0"/>
             </a:xfrm>
             <a:custGeom>
@@ -2483,6 +2483,49 @@
         <p:sp>
           <p:nvSpPr>
             <p:cNvPr id="10" name="pl9"/>
+            <p:cNvSpPr/>
+            <p:nvPr/>
+          </p:nvSpPr>
+          <p:spPr>
+            <a:xfrm>
+              <a:off x="1461154" y="1062033"/>
+              <a:ext cx="4200976" cy="0"/>
+            </a:xfrm>
+            <a:custGeom>
+              <a:avLst/>
+              <a:pathLst>
+                <a:path w="4200976" h="0">
+                  <a:moveTo>
+                    <a:pt x="0" y="0"/>
+                  </a:moveTo>
+                  <a:lnTo>
+                    <a:pt x="4200976" y="0"/>
+                  </a:lnTo>
+                  <a:lnTo>
+                    <a:pt x="4200976" y="0"/>
+                  </a:lnTo>
+                </a:path>
+              </a:pathLst>
+            </a:custGeom>
+            <a:ln w="6775" cap="flat">
+              <a:solidFill>
+                <a:srgbClr val="FFFFFF">
+                  <a:alpha val="100000"/>
+                </a:srgbClr>
+              </a:solidFill>
+              <a:prstDash val="solid"/>
+              <a:round/>
+            </a:ln>
+          </p:spPr>
+          <p:txBody>
+            <a:bodyPr/>
+            <a:lstStyle/>
+            <a:p/>
+          </p:txBody>
+        </p:sp>
+        <p:sp>
+          <p:nvSpPr>
+            <p:cNvPr id="11" name="pl10"/>
             <p:cNvSpPr/>
             <p:nvPr/>
           </p:nvSpPr>
@@ -2525,7 +2568,7 @@
         </p:sp>
         <p:sp>
           <p:nvSpPr>
-            <p:cNvPr id="11" name="pl10"/>
+            <p:cNvPr id="12" name="pl11"/>
             <p:cNvSpPr/>
             <p:nvPr/>
           </p:nvSpPr>
@@ -2568,7 +2611,7 @@
         </p:sp>
         <p:sp>
           <p:nvSpPr>
-            <p:cNvPr id="12" name="pl11"/>
+            <p:cNvPr id="13" name="pl12"/>
             <p:cNvSpPr/>
             <p:nvPr/>
           </p:nvSpPr>
@@ -2611,7 +2654,7 @@
         </p:sp>
         <p:sp>
           <p:nvSpPr>
-            <p:cNvPr id="13" name="pl12"/>
+            <p:cNvPr id="14" name="pl13"/>
             <p:cNvSpPr/>
             <p:nvPr/>
           </p:nvSpPr>
@@ -2654,7 +2697,7 @@
         </p:sp>
         <p:sp>
           <p:nvSpPr>
-            <p:cNvPr id="14" name="pl13"/>
+            <p:cNvPr id="15" name="pl14"/>
             <p:cNvSpPr/>
             <p:nvPr/>
           </p:nvSpPr>
@@ -2697,7 +2740,7 @@
         </p:sp>
         <p:sp>
           <p:nvSpPr>
-            <p:cNvPr id="15" name="pl14"/>
+            <p:cNvPr id="16" name="pl15"/>
             <p:cNvSpPr/>
             <p:nvPr/>
           </p:nvSpPr>
@@ -2740,7 +2783,7 @@
         </p:sp>
         <p:sp>
           <p:nvSpPr>
-            <p:cNvPr id="16" name="pl15"/>
+            <p:cNvPr id="17" name="pl16"/>
             <p:cNvSpPr/>
             <p:nvPr/>
           </p:nvSpPr>
@@ -2783,7 +2826,7 @@
         </p:sp>
         <p:sp>
           <p:nvSpPr>
-            <p:cNvPr id="17" name="pl16"/>
+            <p:cNvPr id="18" name="pl17"/>
             <p:cNvSpPr/>
             <p:nvPr/>
           </p:nvSpPr>
@@ -2826,7 +2869,7 @@
         </p:sp>
         <p:sp>
           <p:nvSpPr>
-            <p:cNvPr id="18" name="pl17"/>
+            <p:cNvPr id="19" name="pl18"/>
             <p:cNvSpPr/>
             <p:nvPr/>
           </p:nvSpPr>
@@ -2869,7 +2912,7 @@
         </p:sp>
         <p:sp>
           <p:nvSpPr>
-            <p:cNvPr id="19" name="pl18"/>
+            <p:cNvPr id="20" name="pl19"/>
             <p:cNvSpPr/>
             <p:nvPr/>
           </p:nvSpPr>
@@ -2912,7 +2955,7 @@
         </p:sp>
         <p:sp>
           <p:nvSpPr>
-            <p:cNvPr id="20" name="pl19"/>
+            <p:cNvPr id="21" name="pl20"/>
             <p:cNvSpPr/>
             <p:nvPr/>
           </p:nvSpPr>
@@ -2955,7 +2998,7 @@
         </p:sp>
         <p:sp>
           <p:nvSpPr>
-            <p:cNvPr id="21" name="pl20"/>
+            <p:cNvPr id="22" name="pl21"/>
             <p:cNvSpPr/>
             <p:nvPr/>
           </p:nvSpPr>
@@ -2998,7 +3041,7 @@
         </p:sp>
         <p:sp>
           <p:nvSpPr>
-            <p:cNvPr id="22" name="pl21"/>
+            <p:cNvPr id="23" name="pl22"/>
             <p:cNvSpPr/>
             <p:nvPr/>
           </p:nvSpPr>
@@ -3041,7 +3084,7 @@
         </p:sp>
         <p:sp>
           <p:nvSpPr>
-            <p:cNvPr id="23" name="pl22"/>
+            <p:cNvPr id="24" name="pl23"/>
             <p:cNvSpPr/>
             <p:nvPr/>
           </p:nvSpPr>
@@ -3084,7 +3127,7 @@
         </p:sp>
         <p:sp>
           <p:nvSpPr>
-            <p:cNvPr id="24" name="pl23"/>
+            <p:cNvPr id="25" name="pl24"/>
             <p:cNvSpPr/>
             <p:nvPr/>
           </p:nvSpPr>
@@ -3127,7 +3170,7 @@
         </p:sp>
         <p:sp>
           <p:nvSpPr>
-            <p:cNvPr id="25" name="pl24"/>
+            <p:cNvPr id="26" name="pl25"/>
             <p:cNvSpPr/>
             <p:nvPr/>
           </p:nvSpPr>
@@ -3170,13 +3213,13 @@
         </p:sp>
         <p:sp>
           <p:nvSpPr>
-            <p:cNvPr id="26" name="pl25"/>
-            <p:cNvSpPr/>
-            <p:nvPr/>
-          </p:nvSpPr>
-          <p:spPr>
-            <a:xfrm>
-              <a:off x="1461154" y="4039744"/>
+            <p:cNvPr id="27" name="pl26"/>
+            <p:cNvSpPr/>
+            <p:nvPr/>
+          </p:nvSpPr>
+          <p:spPr>
+            <a:xfrm>
+              <a:off x="1461154" y="4024575"/>
               <a:ext cx="4200976" cy="0"/>
             </a:xfrm>
             <a:custGeom>
@@ -3213,13 +3256,13 @@
         </p:sp>
         <p:sp>
           <p:nvSpPr>
-            <p:cNvPr id="27" name="pl26"/>
-            <p:cNvSpPr/>
-            <p:nvPr/>
-          </p:nvSpPr>
-          <p:spPr>
-            <a:xfrm>
-              <a:off x="1461154" y="3073617"/>
+            <p:cNvPr id="28" name="pl27"/>
+            <p:cNvSpPr/>
+            <p:nvPr/>
+          </p:nvSpPr>
+          <p:spPr>
+            <a:xfrm>
+              <a:off x="1461154" y="3178134"/>
               <a:ext cx="4200976" cy="0"/>
             </a:xfrm>
             <a:custGeom>
@@ -3256,13 +3299,13 @@
         </p:sp>
         <p:sp>
           <p:nvSpPr>
-            <p:cNvPr id="28" name="pl27"/>
-            <p:cNvSpPr/>
-            <p:nvPr/>
-          </p:nvSpPr>
-          <p:spPr>
-            <a:xfrm>
-              <a:off x="1461154" y="2107490"/>
+            <p:cNvPr id="29" name="pl28"/>
+            <p:cNvSpPr/>
+            <p:nvPr/>
+          </p:nvSpPr>
+          <p:spPr>
+            <a:xfrm>
+              <a:off x="1461154" y="2331694"/>
               <a:ext cx="4200976" cy="0"/>
             </a:xfrm>
             <a:custGeom>
@@ -3299,13 +3342,13 @@
         </p:sp>
         <p:sp>
           <p:nvSpPr>
-            <p:cNvPr id="29" name="pl28"/>
-            <p:cNvSpPr/>
-            <p:nvPr/>
-          </p:nvSpPr>
-          <p:spPr>
-            <a:xfrm>
-              <a:off x="1461154" y="1141363"/>
+            <p:cNvPr id="30" name="pl29"/>
+            <p:cNvSpPr/>
+            <p:nvPr/>
+          </p:nvSpPr>
+          <p:spPr>
+            <a:xfrm>
+              <a:off x="1461154" y="1485253"/>
               <a:ext cx="4200976" cy="0"/>
             </a:xfrm>
             <a:custGeom>
@@ -3342,7 +3385,7 @@
         </p:sp>
         <p:sp>
           <p:nvSpPr>
-            <p:cNvPr id="30" name="pl29"/>
+            <p:cNvPr id="31" name="pl30"/>
             <p:cNvSpPr/>
             <p:nvPr/>
           </p:nvSpPr>
@@ -3385,7 +3428,7 @@
         </p:sp>
         <p:sp>
           <p:nvSpPr>
-            <p:cNvPr id="31" name="pl30"/>
+            <p:cNvPr id="32" name="pl31"/>
             <p:cNvSpPr/>
             <p:nvPr/>
           </p:nvSpPr>
@@ -3428,7 +3471,7 @@
         </p:sp>
         <p:sp>
           <p:nvSpPr>
-            <p:cNvPr id="32" name="pl31"/>
+            <p:cNvPr id="33" name="pl32"/>
             <p:cNvSpPr/>
             <p:nvPr/>
           </p:nvSpPr>
@@ -3471,7 +3514,7 @@
         </p:sp>
         <p:sp>
           <p:nvSpPr>
-            <p:cNvPr id="33" name="pl32"/>
+            <p:cNvPr id="34" name="pl33"/>
             <p:cNvSpPr/>
             <p:nvPr/>
           </p:nvSpPr>
@@ -3514,7 +3557,7 @@
         </p:sp>
         <p:sp>
           <p:nvSpPr>
-            <p:cNvPr id="34" name="pl33"/>
+            <p:cNvPr id="35" name="pl34"/>
             <p:cNvSpPr/>
             <p:nvPr/>
           </p:nvSpPr>
@@ -3557,7 +3600,7 @@
         </p:sp>
         <p:sp>
           <p:nvSpPr>
-            <p:cNvPr id="35" name="pl34"/>
+            <p:cNvPr id="36" name="pl35"/>
             <p:cNvSpPr/>
             <p:nvPr/>
           </p:nvSpPr>
@@ -3600,7 +3643,7 @@
         </p:sp>
         <p:sp>
           <p:nvSpPr>
-            <p:cNvPr id="36" name="pl35"/>
+            <p:cNvPr id="37" name="pl36"/>
             <p:cNvSpPr/>
             <p:nvPr/>
           </p:nvSpPr>
@@ -3643,7 +3686,7 @@
         </p:sp>
         <p:sp>
           <p:nvSpPr>
-            <p:cNvPr id="37" name="pl36"/>
+            <p:cNvPr id="38" name="pl37"/>
             <p:cNvSpPr/>
             <p:nvPr/>
           </p:nvSpPr>
@@ -3686,7 +3729,7 @@
         </p:sp>
         <p:sp>
           <p:nvSpPr>
-            <p:cNvPr id="38" name="pl37"/>
+            <p:cNvPr id="39" name="pl38"/>
             <p:cNvSpPr/>
             <p:nvPr/>
           </p:nvSpPr>
@@ -3729,7 +3772,7 @@
         </p:sp>
         <p:sp>
           <p:nvSpPr>
-            <p:cNvPr id="39" name="pl38"/>
+            <p:cNvPr id="40" name="pl39"/>
             <p:cNvSpPr/>
             <p:nvPr/>
           </p:nvSpPr>
@@ -3772,7 +3815,7 @@
         </p:sp>
         <p:sp>
           <p:nvSpPr>
-            <p:cNvPr id="40" name="pl39"/>
+            <p:cNvPr id="41" name="pl40"/>
             <p:cNvSpPr/>
             <p:nvPr/>
           </p:nvSpPr>
@@ -3815,7 +3858,7 @@
         </p:sp>
         <p:sp>
           <p:nvSpPr>
-            <p:cNvPr id="41" name="pl40"/>
+            <p:cNvPr id="42" name="pl41"/>
             <p:cNvSpPr/>
             <p:nvPr/>
           </p:nvSpPr>
@@ -3858,7 +3901,7 @@
         </p:sp>
         <p:sp>
           <p:nvSpPr>
-            <p:cNvPr id="42" name="pl41"/>
+            <p:cNvPr id="43" name="pl42"/>
             <p:cNvSpPr/>
             <p:nvPr/>
           </p:nvSpPr>
@@ -3901,7 +3944,7 @@
         </p:sp>
         <p:sp>
           <p:nvSpPr>
-            <p:cNvPr id="43" name="pl42"/>
+            <p:cNvPr id="44" name="pl43"/>
             <p:cNvSpPr/>
             <p:nvPr/>
           </p:nvSpPr>
@@ -3944,93 +3987,180 @@
         </p:sp>
         <p:sp>
           <p:nvSpPr>
-            <p:cNvPr id="44" name="pl43"/>
-            <p:cNvSpPr/>
-            <p:nvPr/>
-          </p:nvSpPr>
-          <p:spPr>
-            <a:xfrm>
-              <a:off x="2465428" y="1128778"/>
-              <a:ext cx="2864302" cy="2895796"/>
+            <p:cNvPr id="45" name="pl44"/>
+            <p:cNvSpPr/>
+            <p:nvPr/>
+          </p:nvSpPr>
+          <p:spPr>
+            <a:xfrm>
+              <a:off x="1687470" y="1128778"/>
+              <a:ext cx="3748346" cy="2895796"/>
             </a:xfrm>
             <a:custGeom>
               <a:avLst/>
               <a:pathLst>
-                <a:path w="2864302" h="2895796">
+                <a:path w="3748346" h="2895796">
                   <a:moveTo>
                     <a:pt x="0" y="2895796"/>
                   </a:moveTo>
                   <a:lnTo>
-                    <a:pt x="919405" y="2435384"/>
-                  </a:lnTo>
-                  <a:lnTo>
-                    <a:pt x="1060852" y="2264473"/>
-                  </a:lnTo>
-                  <a:lnTo>
-                    <a:pt x="1166937" y="2097564"/>
-                  </a:lnTo>
-                  <a:lnTo>
-                    <a:pt x="1273023" y="1775523"/>
-                  </a:lnTo>
-                  <a:lnTo>
-                    <a:pt x="1343746" y="1445228"/>
-                  </a:lnTo>
-                  <a:lnTo>
-                    <a:pt x="1414470" y="1036874"/>
-                  </a:lnTo>
-                  <a:lnTo>
-                    <a:pt x="1485193" y="638503"/>
-                  </a:lnTo>
-                  <a:lnTo>
-                    <a:pt x="1555917" y="277788"/>
-                  </a:lnTo>
-                  <a:lnTo>
-                    <a:pt x="1626640" y="0"/>
-                  </a:lnTo>
-                  <a:lnTo>
-                    <a:pt x="1697364" y="8222"/>
-                  </a:lnTo>
-                  <a:lnTo>
-                    <a:pt x="1768087" y="271853"/>
-                  </a:lnTo>
-                  <a:lnTo>
-                    <a:pt x="1838811" y="638587"/>
-                  </a:lnTo>
-                  <a:lnTo>
-                    <a:pt x="1909534" y="1007435"/>
-                  </a:lnTo>
-                  <a:lnTo>
-                    <a:pt x="1980258" y="1302762"/>
-                  </a:lnTo>
-                  <a:lnTo>
-                    <a:pt x="2050981" y="1518319"/>
-                  </a:lnTo>
-                  <a:lnTo>
-                    <a:pt x="2157067" y="1668109"/>
-                  </a:lnTo>
-                  <a:lnTo>
-                    <a:pt x="2263152" y="1603884"/>
-                  </a:lnTo>
-                  <a:lnTo>
-                    <a:pt x="2333875" y="1503143"/>
-                  </a:lnTo>
-                  <a:lnTo>
-                    <a:pt x="2404599" y="1407930"/>
-                  </a:lnTo>
-                  <a:lnTo>
-                    <a:pt x="2475322" y="1363759"/>
-                  </a:lnTo>
-                  <a:lnTo>
-                    <a:pt x="2546046" y="1486071"/>
-                  </a:lnTo>
-                  <a:lnTo>
-                    <a:pt x="2616769" y="1723045"/>
-                  </a:lnTo>
-                  <a:lnTo>
-                    <a:pt x="2687493" y="2009622"/>
-                  </a:lnTo>
-                  <a:lnTo>
-                    <a:pt x="2864302" y="2578203"/>
+                    <a:pt x="70723" y="2895796"/>
+                  </a:lnTo>
+                  <a:lnTo>
+                    <a:pt x="141447" y="2895796"/>
+                  </a:lnTo>
+                  <a:lnTo>
+                    <a:pt x="212170" y="2895796"/>
+                  </a:lnTo>
+                  <a:lnTo>
+                    <a:pt x="282894" y="2895796"/>
+                  </a:lnTo>
+                  <a:lnTo>
+                    <a:pt x="353617" y="2895796"/>
+                  </a:lnTo>
+                  <a:lnTo>
+                    <a:pt x="424341" y="2895795"/>
+                  </a:lnTo>
+                  <a:lnTo>
+                    <a:pt x="495064" y="2895794"/>
+                  </a:lnTo>
+                  <a:lnTo>
+                    <a:pt x="565788" y="2895792"/>
+                  </a:lnTo>
+                  <a:lnTo>
+                    <a:pt x="636511" y="2895788"/>
+                  </a:lnTo>
+                  <a:lnTo>
+                    <a:pt x="707235" y="2895780"/>
+                  </a:lnTo>
+                  <a:lnTo>
+                    <a:pt x="777958" y="2895761"/>
+                  </a:lnTo>
+                  <a:lnTo>
+                    <a:pt x="848682" y="2895722"/>
+                  </a:lnTo>
+                  <a:lnTo>
+                    <a:pt x="919405" y="2895641"/>
+                  </a:lnTo>
+                  <a:lnTo>
+                    <a:pt x="990129" y="2895467"/>
+                  </a:lnTo>
+                  <a:lnTo>
+                    <a:pt x="1060852" y="2895102"/>
+                  </a:lnTo>
+                  <a:lnTo>
+                    <a:pt x="1131576" y="2894330"/>
+                  </a:lnTo>
+                  <a:lnTo>
+                    <a:pt x="1202299" y="2892704"/>
+                  </a:lnTo>
+                  <a:lnTo>
+                    <a:pt x="1273023" y="2889289"/>
+                  </a:lnTo>
+                  <a:lnTo>
+                    <a:pt x="1343746" y="2882150"/>
+                  </a:lnTo>
+                  <a:lnTo>
+                    <a:pt x="1414470" y="2867526"/>
+                  </a:lnTo>
+                  <a:lnTo>
+                    <a:pt x="1485193" y="2837768"/>
+                  </a:lnTo>
+                  <a:lnTo>
+                    <a:pt x="1555917" y="2783839"/>
+                  </a:lnTo>
+                  <a:lnTo>
+                    <a:pt x="1626640" y="2683813"/>
+                  </a:lnTo>
+                  <a:lnTo>
+                    <a:pt x="1697364" y="2531212"/>
+                  </a:lnTo>
+                  <a:lnTo>
+                    <a:pt x="1768087" y="2336226"/>
+                  </a:lnTo>
+                  <a:lnTo>
+                    <a:pt x="1838811" y="2267813"/>
+                  </a:lnTo>
+                  <a:lnTo>
+                    <a:pt x="1909534" y="2211885"/>
+                  </a:lnTo>
+                  <a:lnTo>
+                    <a:pt x="1980258" y="2173010"/>
+                  </a:lnTo>
+                  <a:lnTo>
+                    <a:pt x="2050981" y="1975660"/>
+                  </a:lnTo>
+                  <a:lnTo>
+                    <a:pt x="2121705" y="1642403"/>
+                  </a:lnTo>
+                  <a:lnTo>
+                    <a:pt x="2192428" y="1271367"/>
+                  </a:lnTo>
+                  <a:lnTo>
+                    <a:pt x="2263152" y="838577"/>
+                  </a:lnTo>
+                  <a:lnTo>
+                    <a:pt x="2333875" y="504086"/>
+                  </a:lnTo>
+                  <a:lnTo>
+                    <a:pt x="2404599" y="206204"/>
+                  </a:lnTo>
+                  <a:lnTo>
+                    <a:pt x="2475322" y="0"/>
+                  </a:lnTo>
+                  <a:lnTo>
+                    <a:pt x="2546046" y="407290"/>
+                  </a:lnTo>
+                  <a:lnTo>
+                    <a:pt x="2616769" y="985269"/>
+                  </a:lnTo>
+                  <a:lnTo>
+                    <a:pt x="2687493" y="1323640"/>
+                  </a:lnTo>
+                  <a:lnTo>
+                    <a:pt x="2758216" y="1609777"/>
+                  </a:lnTo>
+                  <a:lnTo>
+                    <a:pt x="2828940" y="1933298"/>
+                  </a:lnTo>
+                  <a:lnTo>
+                    <a:pt x="2899663" y="2082105"/>
+                  </a:lnTo>
+                  <a:lnTo>
+                    <a:pt x="2970387" y="2046800"/>
+                  </a:lnTo>
+                  <a:lnTo>
+                    <a:pt x="3041110" y="1893380"/>
+                  </a:lnTo>
+                  <a:lnTo>
+                    <a:pt x="3111834" y="1610544"/>
+                  </a:lnTo>
+                  <a:lnTo>
+                    <a:pt x="3182557" y="1424078"/>
+                  </a:lnTo>
+                  <a:lnTo>
+                    <a:pt x="3253281" y="1271332"/>
+                  </a:lnTo>
+                  <a:lnTo>
+                    <a:pt x="3324004" y="1424267"/>
+                  </a:lnTo>
+                  <a:lnTo>
+                    <a:pt x="3394728" y="1705603"/>
+                  </a:lnTo>
+                  <a:lnTo>
+                    <a:pt x="3465451" y="2156809"/>
+                  </a:lnTo>
+                  <a:lnTo>
+                    <a:pt x="3536175" y="2443154"/>
+                  </a:lnTo>
+                  <a:lnTo>
+                    <a:pt x="3606899" y="2621823"/>
+                  </a:lnTo>
+                  <a:lnTo>
+                    <a:pt x="3677622" y="2709088"/>
+                  </a:lnTo>
+                  <a:lnTo>
+                    <a:pt x="3748346" y="2763881"/>
                   </a:lnTo>
                 </a:path>
               </a:pathLst>
@@ -4053,13 +4183,13 @@
         </p:sp>
         <p:sp>
           <p:nvSpPr>
-            <p:cNvPr id="45" name="pt44"/>
-            <p:cNvSpPr/>
-            <p:nvPr/>
-          </p:nvSpPr>
-          <p:spPr>
-            <a:xfrm>
-              <a:off x="2440602" y="3999749"/>
+            <p:cNvPr id="46" name="pt45"/>
+            <p:cNvSpPr/>
+            <p:nvPr/>
+          </p:nvSpPr>
+          <p:spPr>
+            <a:xfrm>
+              <a:off x="1662644" y="3999749"/>
               <a:ext cx="49651" cy="49651"/>
             </a:xfrm>
             <a:prstGeom prst="ellipse">
@@ -4088,13 +4218,13 @@
         </p:sp>
         <p:sp>
           <p:nvSpPr>
-            <p:cNvPr id="46" name="pt45"/>
-            <p:cNvSpPr/>
-            <p:nvPr/>
-          </p:nvSpPr>
-          <p:spPr>
-            <a:xfrm>
-              <a:off x="3360008" y="3539337"/>
+            <p:cNvPr id="47" name="pt46"/>
+            <p:cNvSpPr/>
+            <p:nvPr/>
+          </p:nvSpPr>
+          <p:spPr>
+            <a:xfrm>
+              <a:off x="1733367" y="3999749"/>
               <a:ext cx="49651" cy="49651"/>
             </a:xfrm>
             <a:prstGeom prst="ellipse">
@@ -4123,13 +4253,13 @@
         </p:sp>
         <p:sp>
           <p:nvSpPr>
-            <p:cNvPr id="47" name="pt46"/>
-            <p:cNvSpPr/>
-            <p:nvPr/>
-          </p:nvSpPr>
-          <p:spPr>
-            <a:xfrm>
-              <a:off x="3501455" y="3368426"/>
+            <p:cNvPr id="48" name="pt47"/>
+            <p:cNvSpPr/>
+            <p:nvPr/>
+          </p:nvSpPr>
+          <p:spPr>
+            <a:xfrm>
+              <a:off x="1804091" y="3999749"/>
               <a:ext cx="49651" cy="49651"/>
             </a:xfrm>
             <a:prstGeom prst="ellipse">
@@ -4158,13 +4288,13 @@
         </p:sp>
         <p:sp>
           <p:nvSpPr>
-            <p:cNvPr id="48" name="pt47"/>
-            <p:cNvSpPr/>
-            <p:nvPr/>
-          </p:nvSpPr>
-          <p:spPr>
-            <a:xfrm>
-              <a:off x="3607540" y="3201517"/>
+            <p:cNvPr id="49" name="pt48"/>
+            <p:cNvSpPr/>
+            <p:nvPr/>
+          </p:nvSpPr>
+          <p:spPr>
+            <a:xfrm>
+              <a:off x="1874814" y="3999749"/>
               <a:ext cx="49651" cy="49651"/>
             </a:xfrm>
             <a:prstGeom prst="ellipse">
@@ -4193,13 +4323,13 @@
         </p:sp>
         <p:sp>
           <p:nvSpPr>
-            <p:cNvPr id="49" name="pt48"/>
-            <p:cNvSpPr/>
-            <p:nvPr/>
-          </p:nvSpPr>
-          <p:spPr>
-            <a:xfrm>
-              <a:off x="3713625" y="2879476"/>
+            <p:cNvPr id="50" name="pt49"/>
+            <p:cNvSpPr/>
+            <p:nvPr/>
+          </p:nvSpPr>
+          <p:spPr>
+            <a:xfrm>
+              <a:off x="1945538" y="3999749"/>
               <a:ext cx="49651" cy="49651"/>
             </a:xfrm>
             <a:prstGeom prst="ellipse">
@@ -4228,13 +4358,13 @@
         </p:sp>
         <p:sp>
           <p:nvSpPr>
-            <p:cNvPr id="50" name="pt49"/>
-            <p:cNvSpPr/>
-            <p:nvPr/>
-          </p:nvSpPr>
-          <p:spPr>
-            <a:xfrm>
-              <a:off x="3784349" y="2549181"/>
+            <p:cNvPr id="51" name="pt50"/>
+            <p:cNvSpPr/>
+            <p:nvPr/>
+          </p:nvSpPr>
+          <p:spPr>
+            <a:xfrm>
+              <a:off x="2016261" y="3999749"/>
               <a:ext cx="49651" cy="49651"/>
             </a:xfrm>
             <a:prstGeom prst="ellipse">
@@ -4263,13 +4393,13 @@
         </p:sp>
         <p:sp>
           <p:nvSpPr>
-            <p:cNvPr id="51" name="pt50"/>
-            <p:cNvSpPr/>
-            <p:nvPr/>
-          </p:nvSpPr>
-          <p:spPr>
-            <a:xfrm>
-              <a:off x="3855072" y="2140827"/>
+            <p:cNvPr id="52" name="pt51"/>
+            <p:cNvSpPr/>
+            <p:nvPr/>
+          </p:nvSpPr>
+          <p:spPr>
+            <a:xfrm>
+              <a:off x="2086985" y="3999748"/>
               <a:ext cx="49651" cy="49651"/>
             </a:xfrm>
             <a:prstGeom prst="ellipse">
@@ -4298,13 +4428,13 @@
         </p:sp>
         <p:sp>
           <p:nvSpPr>
-            <p:cNvPr id="52" name="pt51"/>
-            <p:cNvSpPr/>
-            <p:nvPr/>
-          </p:nvSpPr>
-          <p:spPr>
-            <a:xfrm>
-              <a:off x="3925796" y="1742456"/>
+            <p:cNvPr id="53" name="pt52"/>
+            <p:cNvSpPr/>
+            <p:nvPr/>
+          </p:nvSpPr>
+          <p:spPr>
+            <a:xfrm>
+              <a:off x="2157708" y="3999747"/>
               <a:ext cx="49651" cy="49651"/>
             </a:xfrm>
             <a:prstGeom prst="ellipse">
@@ -4333,13 +4463,13 @@
         </p:sp>
         <p:sp>
           <p:nvSpPr>
-            <p:cNvPr id="53" name="pt52"/>
-            <p:cNvSpPr/>
-            <p:nvPr/>
-          </p:nvSpPr>
-          <p:spPr>
-            <a:xfrm>
-              <a:off x="3996519" y="1381741"/>
+            <p:cNvPr id="54" name="pt53"/>
+            <p:cNvSpPr/>
+            <p:nvPr/>
+          </p:nvSpPr>
+          <p:spPr>
+            <a:xfrm>
+              <a:off x="2228432" y="3999745"/>
               <a:ext cx="49651" cy="49651"/>
             </a:xfrm>
             <a:prstGeom prst="ellipse">
@@ -4368,13 +4498,13 @@
         </p:sp>
         <p:sp>
           <p:nvSpPr>
-            <p:cNvPr id="54" name="pt53"/>
-            <p:cNvSpPr/>
-            <p:nvPr/>
-          </p:nvSpPr>
-          <p:spPr>
-            <a:xfrm>
-              <a:off x="4067243" y="1103952"/>
+            <p:cNvPr id="55" name="pt54"/>
+            <p:cNvSpPr/>
+            <p:nvPr/>
+          </p:nvSpPr>
+          <p:spPr>
+            <a:xfrm>
+              <a:off x="2299155" y="3999741"/>
               <a:ext cx="49651" cy="49651"/>
             </a:xfrm>
             <a:prstGeom prst="ellipse">
@@ -4403,13 +4533,13 @@
         </p:sp>
         <p:sp>
           <p:nvSpPr>
-            <p:cNvPr id="55" name="pt54"/>
-            <p:cNvSpPr/>
-            <p:nvPr/>
-          </p:nvSpPr>
-          <p:spPr>
-            <a:xfrm>
-              <a:off x="4137967" y="1112175"/>
+            <p:cNvPr id="56" name="pt55"/>
+            <p:cNvSpPr/>
+            <p:nvPr/>
+          </p:nvSpPr>
+          <p:spPr>
+            <a:xfrm>
+              <a:off x="2369879" y="3999733"/>
               <a:ext cx="49651" cy="49651"/>
             </a:xfrm>
             <a:prstGeom prst="ellipse">
@@ -4438,13 +4568,13 @@
         </p:sp>
         <p:sp>
           <p:nvSpPr>
-            <p:cNvPr id="56" name="pt55"/>
-            <p:cNvSpPr/>
-            <p:nvPr/>
-          </p:nvSpPr>
-          <p:spPr>
-            <a:xfrm>
-              <a:off x="4208690" y="1375806"/>
+            <p:cNvPr id="57" name="pt56"/>
+            <p:cNvSpPr/>
+            <p:nvPr/>
+          </p:nvSpPr>
+          <p:spPr>
+            <a:xfrm>
+              <a:off x="2440602" y="3999714"/>
               <a:ext cx="49651" cy="49651"/>
             </a:xfrm>
             <a:prstGeom prst="ellipse">
@@ -4473,13 +4603,13 @@
         </p:sp>
         <p:sp>
           <p:nvSpPr>
-            <p:cNvPr id="57" name="pt56"/>
-            <p:cNvSpPr/>
-            <p:nvPr/>
-          </p:nvSpPr>
-          <p:spPr>
-            <a:xfrm>
-              <a:off x="4279414" y="1742540"/>
+            <p:cNvPr id="58" name="pt57"/>
+            <p:cNvSpPr/>
+            <p:nvPr/>
+          </p:nvSpPr>
+          <p:spPr>
+            <a:xfrm>
+              <a:off x="2511326" y="3999675"/>
               <a:ext cx="49651" cy="49651"/>
             </a:xfrm>
             <a:prstGeom prst="ellipse">
@@ -4508,13 +4638,13 @@
         </p:sp>
         <p:sp>
           <p:nvSpPr>
-            <p:cNvPr id="58" name="pt57"/>
-            <p:cNvSpPr/>
-            <p:nvPr/>
-          </p:nvSpPr>
-          <p:spPr>
-            <a:xfrm>
-              <a:off x="4350137" y="2111388"/>
+            <p:cNvPr id="59" name="pt58"/>
+            <p:cNvSpPr/>
+            <p:nvPr/>
+          </p:nvSpPr>
+          <p:spPr>
+            <a:xfrm>
+              <a:off x="2582049" y="3999593"/>
               <a:ext cx="49651" cy="49651"/>
             </a:xfrm>
             <a:prstGeom prst="ellipse">
@@ -4543,13 +4673,13 @@
         </p:sp>
         <p:sp>
           <p:nvSpPr>
-            <p:cNvPr id="59" name="pt58"/>
-            <p:cNvSpPr/>
-            <p:nvPr/>
-          </p:nvSpPr>
-          <p:spPr>
-            <a:xfrm>
-              <a:off x="4420861" y="2406714"/>
+            <p:cNvPr id="60" name="pt59"/>
+            <p:cNvSpPr/>
+            <p:nvPr/>
+          </p:nvSpPr>
+          <p:spPr>
+            <a:xfrm>
+              <a:off x="2652773" y="3999420"/>
               <a:ext cx="49651" cy="49651"/>
             </a:xfrm>
             <a:prstGeom prst="ellipse">
@@ -4578,13 +4708,13 @@
         </p:sp>
         <p:sp>
           <p:nvSpPr>
-            <p:cNvPr id="60" name="pt59"/>
-            <p:cNvSpPr/>
-            <p:nvPr/>
-          </p:nvSpPr>
-          <p:spPr>
-            <a:xfrm>
-              <a:off x="4491584" y="2622272"/>
+            <p:cNvPr id="61" name="pt60"/>
+            <p:cNvSpPr/>
+            <p:nvPr/>
+          </p:nvSpPr>
+          <p:spPr>
+            <a:xfrm>
+              <a:off x="2723496" y="3999055"/>
               <a:ext cx="49651" cy="49651"/>
             </a:xfrm>
             <a:prstGeom prst="ellipse">
@@ -4613,13 +4743,13 @@
         </p:sp>
         <p:sp>
           <p:nvSpPr>
-            <p:cNvPr id="61" name="pt60"/>
-            <p:cNvSpPr/>
-            <p:nvPr/>
-          </p:nvSpPr>
-          <p:spPr>
-            <a:xfrm>
-              <a:off x="4597669" y="2772062"/>
+            <p:cNvPr id="62" name="pt61"/>
+            <p:cNvSpPr/>
+            <p:nvPr/>
+          </p:nvSpPr>
+          <p:spPr>
+            <a:xfrm>
+              <a:off x="2794220" y="3998283"/>
               <a:ext cx="49651" cy="49651"/>
             </a:xfrm>
             <a:prstGeom prst="ellipse">
@@ -4648,13 +4778,13 @@
         </p:sp>
         <p:sp>
           <p:nvSpPr>
-            <p:cNvPr id="62" name="pt61"/>
-            <p:cNvSpPr/>
-            <p:nvPr/>
-          </p:nvSpPr>
-          <p:spPr>
-            <a:xfrm>
-              <a:off x="4703755" y="2707837"/>
+            <p:cNvPr id="63" name="pt62"/>
+            <p:cNvSpPr/>
+            <p:nvPr/>
+          </p:nvSpPr>
+          <p:spPr>
+            <a:xfrm>
+              <a:off x="2864943" y="3996657"/>
               <a:ext cx="49651" cy="49651"/>
             </a:xfrm>
             <a:prstGeom prst="ellipse">
@@ -4683,13 +4813,13 @@
         </p:sp>
         <p:sp>
           <p:nvSpPr>
-            <p:cNvPr id="63" name="pt62"/>
-            <p:cNvSpPr/>
-            <p:nvPr/>
-          </p:nvSpPr>
-          <p:spPr>
-            <a:xfrm>
-              <a:off x="4774478" y="2607096"/>
+            <p:cNvPr id="64" name="pt63"/>
+            <p:cNvSpPr/>
+            <p:nvPr/>
+          </p:nvSpPr>
+          <p:spPr>
+            <a:xfrm>
+              <a:off x="2935667" y="3993242"/>
               <a:ext cx="49651" cy="49651"/>
             </a:xfrm>
             <a:prstGeom prst="ellipse">
@@ -4718,13 +4848,13 @@
         </p:sp>
         <p:sp>
           <p:nvSpPr>
-            <p:cNvPr id="64" name="pt63"/>
-            <p:cNvSpPr/>
-            <p:nvPr/>
-          </p:nvSpPr>
-          <p:spPr>
-            <a:xfrm>
-              <a:off x="4845202" y="2511883"/>
+            <p:cNvPr id="65" name="pt64"/>
+            <p:cNvSpPr/>
+            <p:nvPr/>
+          </p:nvSpPr>
+          <p:spPr>
+            <a:xfrm>
+              <a:off x="3006390" y="3986103"/>
               <a:ext cx="49651" cy="49651"/>
             </a:xfrm>
             <a:prstGeom prst="ellipse">
@@ -4753,13 +4883,13 @@
         </p:sp>
         <p:sp>
           <p:nvSpPr>
-            <p:cNvPr id="65" name="pt64"/>
-            <p:cNvSpPr/>
-            <p:nvPr/>
-          </p:nvSpPr>
-          <p:spPr>
-            <a:xfrm>
-              <a:off x="4915925" y="2467712"/>
+            <p:cNvPr id="66" name="pt65"/>
+            <p:cNvSpPr/>
+            <p:nvPr/>
+          </p:nvSpPr>
+          <p:spPr>
+            <a:xfrm>
+              <a:off x="3077114" y="3971479"/>
               <a:ext cx="49651" cy="49651"/>
             </a:xfrm>
             <a:prstGeom prst="ellipse">
@@ -4788,13 +4918,13 @@
         </p:sp>
         <p:sp>
           <p:nvSpPr>
-            <p:cNvPr id="66" name="pt65"/>
-            <p:cNvSpPr/>
-            <p:nvPr/>
-          </p:nvSpPr>
-          <p:spPr>
-            <a:xfrm>
-              <a:off x="4986649" y="2590024"/>
+            <p:cNvPr id="67" name="pt66"/>
+            <p:cNvSpPr/>
+            <p:nvPr/>
+          </p:nvSpPr>
+          <p:spPr>
+            <a:xfrm>
+              <a:off x="3147837" y="3941721"/>
               <a:ext cx="49651" cy="49651"/>
             </a:xfrm>
             <a:prstGeom prst="ellipse">
@@ -4823,13 +4953,13 @@
         </p:sp>
         <p:sp>
           <p:nvSpPr>
-            <p:cNvPr id="67" name="pt66"/>
-            <p:cNvSpPr/>
-            <p:nvPr/>
-          </p:nvSpPr>
-          <p:spPr>
-            <a:xfrm>
-              <a:off x="5057372" y="2826998"/>
+            <p:cNvPr id="68" name="pt67"/>
+            <p:cNvSpPr/>
+            <p:nvPr/>
+          </p:nvSpPr>
+          <p:spPr>
+            <a:xfrm>
+              <a:off x="3218561" y="3887792"/>
               <a:ext cx="49651" cy="49651"/>
             </a:xfrm>
             <a:prstGeom prst="ellipse">
@@ -4858,13 +4988,13 @@
         </p:sp>
         <p:sp>
           <p:nvSpPr>
-            <p:cNvPr id="68" name="pt67"/>
-            <p:cNvSpPr/>
-            <p:nvPr/>
-          </p:nvSpPr>
-          <p:spPr>
-            <a:xfrm>
-              <a:off x="5128096" y="3113575"/>
+            <p:cNvPr id="69" name="pt68"/>
+            <p:cNvSpPr/>
+            <p:nvPr/>
+          </p:nvSpPr>
+          <p:spPr>
+            <a:xfrm>
+              <a:off x="3289284" y="3787766"/>
               <a:ext cx="49651" cy="49651"/>
             </a:xfrm>
             <a:prstGeom prst="ellipse">
@@ -4893,13 +5023,13 @@
         </p:sp>
         <p:sp>
           <p:nvSpPr>
-            <p:cNvPr id="69" name="pt68"/>
-            <p:cNvSpPr/>
-            <p:nvPr/>
-          </p:nvSpPr>
-          <p:spPr>
-            <a:xfrm>
-              <a:off x="5304904" y="3682156"/>
+            <p:cNvPr id="70" name="pt69"/>
+            <p:cNvSpPr/>
+            <p:nvPr/>
+          </p:nvSpPr>
+          <p:spPr>
+            <a:xfrm>
+              <a:off x="3360008" y="3635165"/>
               <a:ext cx="49651" cy="49651"/>
             </a:xfrm>
             <a:prstGeom prst="ellipse">
@@ -4928,13 +5058,1028 @@
         </p:sp>
         <p:sp>
           <p:nvSpPr>
-            <p:cNvPr id="70" name="tx69"/>
-            <p:cNvSpPr/>
-            <p:nvPr/>
-          </p:nvSpPr>
-          <p:spPr>
-            <a:xfrm>
-              <a:off x="1149684" y="3995952"/>
+            <p:cNvPr id="71" name="pt70"/>
+            <p:cNvSpPr/>
+            <p:nvPr/>
+          </p:nvSpPr>
+          <p:spPr>
+            <a:xfrm>
+              <a:off x="3430731" y="3440179"/>
+              <a:ext cx="49651" cy="49651"/>
+            </a:xfrm>
+            <a:prstGeom prst="ellipse">
+              <a:avLst/>
+            </a:prstGeom>
+            <a:solidFill>
+              <a:srgbClr val="F8766D">
+                <a:alpha val="100000"/>
+              </a:srgbClr>
+            </a:solidFill>
+            <a:ln w="9000" cap="rnd">
+              <a:solidFill>
+                <a:srgbClr val="F8766D">
+                  <a:alpha val="100000"/>
+                </a:srgbClr>
+              </a:solidFill>
+              <a:prstDash val="solid"/>
+              <a:round/>
+            </a:ln>
+          </p:spPr>
+          <p:txBody>
+            <a:bodyPr/>
+            <a:lstStyle/>
+            <a:p/>
+          </p:txBody>
+        </p:sp>
+        <p:sp>
+          <p:nvSpPr>
+            <p:cNvPr id="72" name="pt71"/>
+            <p:cNvSpPr/>
+            <p:nvPr/>
+          </p:nvSpPr>
+          <p:spPr>
+            <a:xfrm>
+              <a:off x="3501455" y="3371766"/>
+              <a:ext cx="49651" cy="49651"/>
+            </a:xfrm>
+            <a:prstGeom prst="ellipse">
+              <a:avLst/>
+            </a:prstGeom>
+            <a:solidFill>
+              <a:srgbClr val="F8766D">
+                <a:alpha val="100000"/>
+              </a:srgbClr>
+            </a:solidFill>
+            <a:ln w="9000" cap="rnd">
+              <a:solidFill>
+                <a:srgbClr val="F8766D">
+                  <a:alpha val="100000"/>
+                </a:srgbClr>
+              </a:solidFill>
+              <a:prstDash val="solid"/>
+              <a:round/>
+            </a:ln>
+          </p:spPr>
+          <p:txBody>
+            <a:bodyPr/>
+            <a:lstStyle/>
+            <a:p/>
+          </p:txBody>
+        </p:sp>
+        <p:sp>
+          <p:nvSpPr>
+            <p:cNvPr id="73" name="pt72"/>
+            <p:cNvSpPr/>
+            <p:nvPr/>
+          </p:nvSpPr>
+          <p:spPr>
+            <a:xfrm>
+              <a:off x="3572178" y="3315838"/>
+              <a:ext cx="49651" cy="49651"/>
+            </a:xfrm>
+            <a:prstGeom prst="ellipse">
+              <a:avLst/>
+            </a:prstGeom>
+            <a:solidFill>
+              <a:srgbClr val="F8766D">
+                <a:alpha val="100000"/>
+              </a:srgbClr>
+            </a:solidFill>
+            <a:ln w="9000" cap="rnd">
+              <a:solidFill>
+                <a:srgbClr val="F8766D">
+                  <a:alpha val="100000"/>
+                </a:srgbClr>
+              </a:solidFill>
+              <a:prstDash val="solid"/>
+              <a:round/>
+            </a:ln>
+          </p:spPr>
+          <p:txBody>
+            <a:bodyPr/>
+            <a:lstStyle/>
+            <a:p/>
+          </p:txBody>
+        </p:sp>
+        <p:sp>
+          <p:nvSpPr>
+            <p:cNvPr id="74" name="pt73"/>
+            <p:cNvSpPr/>
+            <p:nvPr/>
+          </p:nvSpPr>
+          <p:spPr>
+            <a:xfrm>
+              <a:off x="3642902" y="3276963"/>
+              <a:ext cx="49651" cy="49651"/>
+            </a:xfrm>
+            <a:prstGeom prst="ellipse">
+              <a:avLst/>
+            </a:prstGeom>
+            <a:solidFill>
+              <a:srgbClr val="F8766D">
+                <a:alpha val="100000"/>
+              </a:srgbClr>
+            </a:solidFill>
+            <a:ln w="9000" cap="rnd">
+              <a:solidFill>
+                <a:srgbClr val="F8766D">
+                  <a:alpha val="100000"/>
+                </a:srgbClr>
+              </a:solidFill>
+              <a:prstDash val="solid"/>
+              <a:round/>
+            </a:ln>
+          </p:spPr>
+          <p:txBody>
+            <a:bodyPr/>
+            <a:lstStyle/>
+            <a:p/>
+          </p:txBody>
+        </p:sp>
+        <p:sp>
+          <p:nvSpPr>
+            <p:cNvPr id="75" name="pt74"/>
+            <p:cNvSpPr/>
+            <p:nvPr/>
+          </p:nvSpPr>
+          <p:spPr>
+            <a:xfrm>
+              <a:off x="3713625" y="3079613"/>
+              <a:ext cx="49651" cy="49651"/>
+            </a:xfrm>
+            <a:prstGeom prst="ellipse">
+              <a:avLst/>
+            </a:prstGeom>
+            <a:solidFill>
+              <a:srgbClr val="F8766D">
+                <a:alpha val="100000"/>
+              </a:srgbClr>
+            </a:solidFill>
+            <a:ln w="9000" cap="rnd">
+              <a:solidFill>
+                <a:srgbClr val="F8766D">
+                  <a:alpha val="100000"/>
+                </a:srgbClr>
+              </a:solidFill>
+              <a:prstDash val="solid"/>
+              <a:round/>
+            </a:ln>
+          </p:spPr>
+          <p:txBody>
+            <a:bodyPr/>
+            <a:lstStyle/>
+            <a:p/>
+          </p:txBody>
+        </p:sp>
+        <p:sp>
+          <p:nvSpPr>
+            <p:cNvPr id="76" name="pt75"/>
+            <p:cNvSpPr/>
+            <p:nvPr/>
+          </p:nvSpPr>
+          <p:spPr>
+            <a:xfrm>
+              <a:off x="3784349" y="2746356"/>
+              <a:ext cx="49651" cy="49651"/>
+            </a:xfrm>
+            <a:prstGeom prst="ellipse">
+              <a:avLst/>
+            </a:prstGeom>
+            <a:solidFill>
+              <a:srgbClr val="F8766D">
+                <a:alpha val="100000"/>
+              </a:srgbClr>
+            </a:solidFill>
+            <a:ln w="9000" cap="rnd">
+              <a:solidFill>
+                <a:srgbClr val="F8766D">
+                  <a:alpha val="100000"/>
+                </a:srgbClr>
+              </a:solidFill>
+              <a:prstDash val="solid"/>
+              <a:round/>
+            </a:ln>
+          </p:spPr>
+          <p:txBody>
+            <a:bodyPr/>
+            <a:lstStyle/>
+            <a:p/>
+          </p:txBody>
+        </p:sp>
+        <p:sp>
+          <p:nvSpPr>
+            <p:cNvPr id="77" name="pt76"/>
+            <p:cNvSpPr/>
+            <p:nvPr/>
+          </p:nvSpPr>
+          <p:spPr>
+            <a:xfrm>
+              <a:off x="3855072" y="2375320"/>
+              <a:ext cx="49651" cy="49651"/>
+            </a:xfrm>
+            <a:prstGeom prst="ellipse">
+              <a:avLst/>
+            </a:prstGeom>
+            <a:solidFill>
+              <a:srgbClr val="F8766D">
+                <a:alpha val="100000"/>
+              </a:srgbClr>
+            </a:solidFill>
+            <a:ln w="9000" cap="rnd">
+              <a:solidFill>
+                <a:srgbClr val="F8766D">
+                  <a:alpha val="100000"/>
+                </a:srgbClr>
+              </a:solidFill>
+              <a:prstDash val="solid"/>
+              <a:round/>
+            </a:ln>
+          </p:spPr>
+          <p:txBody>
+            <a:bodyPr/>
+            <a:lstStyle/>
+            <a:p/>
+          </p:txBody>
+        </p:sp>
+        <p:sp>
+          <p:nvSpPr>
+            <p:cNvPr id="78" name="pt77"/>
+            <p:cNvSpPr/>
+            <p:nvPr/>
+          </p:nvSpPr>
+          <p:spPr>
+            <a:xfrm>
+              <a:off x="3925796" y="1942530"/>
+              <a:ext cx="49651" cy="49651"/>
+            </a:xfrm>
+            <a:prstGeom prst="ellipse">
+              <a:avLst/>
+            </a:prstGeom>
+            <a:solidFill>
+              <a:srgbClr val="F8766D">
+                <a:alpha val="100000"/>
+              </a:srgbClr>
+            </a:solidFill>
+            <a:ln w="9000" cap="rnd">
+              <a:solidFill>
+                <a:srgbClr val="F8766D">
+                  <a:alpha val="100000"/>
+                </a:srgbClr>
+              </a:solidFill>
+              <a:prstDash val="solid"/>
+              <a:round/>
+            </a:ln>
+          </p:spPr>
+          <p:txBody>
+            <a:bodyPr/>
+            <a:lstStyle/>
+            <a:p/>
+          </p:txBody>
+        </p:sp>
+        <p:sp>
+          <p:nvSpPr>
+            <p:cNvPr id="79" name="pt78"/>
+            <p:cNvSpPr/>
+            <p:nvPr/>
+          </p:nvSpPr>
+          <p:spPr>
+            <a:xfrm>
+              <a:off x="3996519" y="1608039"/>
+              <a:ext cx="49651" cy="49651"/>
+            </a:xfrm>
+            <a:prstGeom prst="ellipse">
+              <a:avLst/>
+            </a:prstGeom>
+            <a:solidFill>
+              <a:srgbClr val="F8766D">
+                <a:alpha val="100000"/>
+              </a:srgbClr>
+            </a:solidFill>
+            <a:ln w="9000" cap="rnd">
+              <a:solidFill>
+                <a:srgbClr val="F8766D">
+                  <a:alpha val="100000"/>
+                </a:srgbClr>
+              </a:solidFill>
+              <a:prstDash val="solid"/>
+              <a:round/>
+            </a:ln>
+          </p:spPr>
+          <p:txBody>
+            <a:bodyPr/>
+            <a:lstStyle/>
+            <a:p/>
+          </p:txBody>
+        </p:sp>
+        <p:sp>
+          <p:nvSpPr>
+            <p:cNvPr id="80" name="pt79"/>
+            <p:cNvSpPr/>
+            <p:nvPr/>
+          </p:nvSpPr>
+          <p:spPr>
+            <a:xfrm>
+              <a:off x="4067243" y="1310157"/>
+              <a:ext cx="49651" cy="49651"/>
+            </a:xfrm>
+            <a:prstGeom prst="ellipse">
+              <a:avLst/>
+            </a:prstGeom>
+            <a:solidFill>
+              <a:srgbClr val="F8766D">
+                <a:alpha val="100000"/>
+              </a:srgbClr>
+            </a:solidFill>
+            <a:ln w="9000" cap="rnd">
+              <a:solidFill>
+                <a:srgbClr val="F8766D">
+                  <a:alpha val="100000"/>
+                </a:srgbClr>
+              </a:solidFill>
+              <a:prstDash val="solid"/>
+              <a:round/>
+            </a:ln>
+          </p:spPr>
+          <p:txBody>
+            <a:bodyPr/>
+            <a:lstStyle/>
+            <a:p/>
+          </p:txBody>
+        </p:sp>
+        <p:sp>
+          <p:nvSpPr>
+            <p:cNvPr id="81" name="pt80"/>
+            <p:cNvSpPr/>
+            <p:nvPr/>
+          </p:nvSpPr>
+          <p:spPr>
+            <a:xfrm>
+              <a:off x="4137967" y="1103952"/>
+              <a:ext cx="49651" cy="49651"/>
+            </a:xfrm>
+            <a:prstGeom prst="ellipse">
+              <a:avLst/>
+            </a:prstGeom>
+            <a:solidFill>
+              <a:srgbClr val="F8766D">
+                <a:alpha val="100000"/>
+              </a:srgbClr>
+            </a:solidFill>
+            <a:ln w="9000" cap="rnd">
+              <a:solidFill>
+                <a:srgbClr val="F8766D">
+                  <a:alpha val="100000"/>
+                </a:srgbClr>
+              </a:solidFill>
+              <a:prstDash val="solid"/>
+              <a:round/>
+            </a:ln>
+          </p:spPr>
+          <p:txBody>
+            <a:bodyPr/>
+            <a:lstStyle/>
+            <a:p/>
+          </p:txBody>
+        </p:sp>
+        <p:sp>
+          <p:nvSpPr>
+            <p:cNvPr id="82" name="pt81"/>
+            <p:cNvSpPr/>
+            <p:nvPr/>
+          </p:nvSpPr>
+          <p:spPr>
+            <a:xfrm>
+              <a:off x="4208690" y="1511243"/>
+              <a:ext cx="49651" cy="49651"/>
+            </a:xfrm>
+            <a:prstGeom prst="ellipse">
+              <a:avLst/>
+            </a:prstGeom>
+            <a:solidFill>
+              <a:srgbClr val="F8766D">
+                <a:alpha val="100000"/>
+              </a:srgbClr>
+            </a:solidFill>
+            <a:ln w="9000" cap="rnd">
+              <a:solidFill>
+                <a:srgbClr val="F8766D">
+                  <a:alpha val="100000"/>
+                </a:srgbClr>
+              </a:solidFill>
+              <a:prstDash val="solid"/>
+              <a:round/>
+            </a:ln>
+          </p:spPr>
+          <p:txBody>
+            <a:bodyPr/>
+            <a:lstStyle/>
+            <a:p/>
+          </p:txBody>
+        </p:sp>
+        <p:sp>
+          <p:nvSpPr>
+            <p:cNvPr id="83" name="pt82"/>
+            <p:cNvSpPr/>
+            <p:nvPr/>
+          </p:nvSpPr>
+          <p:spPr>
+            <a:xfrm>
+              <a:off x="4279414" y="2089222"/>
+              <a:ext cx="49651" cy="49651"/>
+            </a:xfrm>
+            <a:prstGeom prst="ellipse">
+              <a:avLst/>
+            </a:prstGeom>
+            <a:solidFill>
+              <a:srgbClr val="F8766D">
+                <a:alpha val="100000"/>
+              </a:srgbClr>
+            </a:solidFill>
+            <a:ln w="9000" cap="rnd">
+              <a:solidFill>
+                <a:srgbClr val="F8766D">
+                  <a:alpha val="100000"/>
+                </a:srgbClr>
+              </a:solidFill>
+              <a:prstDash val="solid"/>
+              <a:round/>
+            </a:ln>
+          </p:spPr>
+          <p:txBody>
+            <a:bodyPr/>
+            <a:lstStyle/>
+            <a:p/>
+          </p:txBody>
+        </p:sp>
+        <p:sp>
+          <p:nvSpPr>
+            <p:cNvPr id="84" name="pt83"/>
+            <p:cNvSpPr/>
+            <p:nvPr/>
+          </p:nvSpPr>
+          <p:spPr>
+            <a:xfrm>
+              <a:off x="4350137" y="2427593"/>
+              <a:ext cx="49651" cy="49651"/>
+            </a:xfrm>
+            <a:prstGeom prst="ellipse">
+              <a:avLst/>
+            </a:prstGeom>
+            <a:solidFill>
+              <a:srgbClr val="F8766D">
+                <a:alpha val="100000"/>
+              </a:srgbClr>
+            </a:solidFill>
+            <a:ln w="9000" cap="rnd">
+              <a:solidFill>
+                <a:srgbClr val="F8766D">
+                  <a:alpha val="100000"/>
+                </a:srgbClr>
+              </a:solidFill>
+              <a:prstDash val="solid"/>
+              <a:round/>
+            </a:ln>
+          </p:spPr>
+          <p:txBody>
+            <a:bodyPr/>
+            <a:lstStyle/>
+            <a:p/>
+          </p:txBody>
+        </p:sp>
+        <p:sp>
+          <p:nvSpPr>
+            <p:cNvPr id="85" name="pt84"/>
+            <p:cNvSpPr/>
+            <p:nvPr/>
+          </p:nvSpPr>
+          <p:spPr>
+            <a:xfrm>
+              <a:off x="4420861" y="2713729"/>
+              <a:ext cx="49651" cy="49651"/>
+            </a:xfrm>
+            <a:prstGeom prst="ellipse">
+              <a:avLst/>
+            </a:prstGeom>
+            <a:solidFill>
+              <a:srgbClr val="F8766D">
+                <a:alpha val="100000"/>
+              </a:srgbClr>
+            </a:solidFill>
+            <a:ln w="9000" cap="rnd">
+              <a:solidFill>
+                <a:srgbClr val="F8766D">
+                  <a:alpha val="100000"/>
+                </a:srgbClr>
+              </a:solidFill>
+              <a:prstDash val="solid"/>
+              <a:round/>
+            </a:ln>
+          </p:spPr>
+          <p:txBody>
+            <a:bodyPr/>
+            <a:lstStyle/>
+            <a:p/>
+          </p:txBody>
+        </p:sp>
+        <p:sp>
+          <p:nvSpPr>
+            <p:cNvPr id="86" name="pt85"/>
+            <p:cNvSpPr/>
+            <p:nvPr/>
+          </p:nvSpPr>
+          <p:spPr>
+            <a:xfrm>
+              <a:off x="4491584" y="3037251"/>
+              <a:ext cx="49651" cy="49651"/>
+            </a:xfrm>
+            <a:prstGeom prst="ellipse">
+              <a:avLst/>
+            </a:prstGeom>
+            <a:solidFill>
+              <a:srgbClr val="F8766D">
+                <a:alpha val="100000"/>
+              </a:srgbClr>
+            </a:solidFill>
+            <a:ln w="9000" cap="rnd">
+              <a:solidFill>
+                <a:srgbClr val="F8766D">
+                  <a:alpha val="100000"/>
+                </a:srgbClr>
+              </a:solidFill>
+              <a:prstDash val="solid"/>
+              <a:round/>
+            </a:ln>
+          </p:spPr>
+          <p:txBody>
+            <a:bodyPr/>
+            <a:lstStyle/>
+            <a:p/>
+          </p:txBody>
+        </p:sp>
+        <p:sp>
+          <p:nvSpPr>
+            <p:cNvPr id="87" name="pt86"/>
+            <p:cNvSpPr/>
+            <p:nvPr/>
+          </p:nvSpPr>
+          <p:spPr>
+            <a:xfrm>
+              <a:off x="4562308" y="3186058"/>
+              <a:ext cx="49651" cy="49651"/>
+            </a:xfrm>
+            <a:prstGeom prst="ellipse">
+              <a:avLst/>
+            </a:prstGeom>
+            <a:solidFill>
+              <a:srgbClr val="F8766D">
+                <a:alpha val="100000"/>
+              </a:srgbClr>
+            </a:solidFill>
+            <a:ln w="9000" cap="rnd">
+              <a:solidFill>
+                <a:srgbClr val="F8766D">
+                  <a:alpha val="100000"/>
+                </a:srgbClr>
+              </a:solidFill>
+              <a:prstDash val="solid"/>
+              <a:round/>
+            </a:ln>
+          </p:spPr>
+          <p:txBody>
+            <a:bodyPr/>
+            <a:lstStyle/>
+            <a:p/>
+          </p:txBody>
+        </p:sp>
+        <p:sp>
+          <p:nvSpPr>
+            <p:cNvPr id="88" name="pt87"/>
+            <p:cNvSpPr/>
+            <p:nvPr/>
+          </p:nvSpPr>
+          <p:spPr>
+            <a:xfrm>
+              <a:off x="4633031" y="3150753"/>
+              <a:ext cx="49651" cy="49651"/>
+            </a:xfrm>
+            <a:prstGeom prst="ellipse">
+              <a:avLst/>
+            </a:prstGeom>
+            <a:solidFill>
+              <a:srgbClr val="F8766D">
+                <a:alpha val="100000"/>
+              </a:srgbClr>
+            </a:solidFill>
+            <a:ln w="9000" cap="rnd">
+              <a:solidFill>
+                <a:srgbClr val="F8766D">
+                  <a:alpha val="100000"/>
+                </a:srgbClr>
+              </a:solidFill>
+              <a:prstDash val="solid"/>
+              <a:round/>
+            </a:ln>
+          </p:spPr>
+          <p:txBody>
+            <a:bodyPr/>
+            <a:lstStyle/>
+            <a:p/>
+          </p:txBody>
+        </p:sp>
+        <p:sp>
+          <p:nvSpPr>
+            <p:cNvPr id="89" name="pt88"/>
+            <p:cNvSpPr/>
+            <p:nvPr/>
+          </p:nvSpPr>
+          <p:spPr>
+            <a:xfrm>
+              <a:off x="4703755" y="2997333"/>
+              <a:ext cx="49651" cy="49651"/>
+            </a:xfrm>
+            <a:prstGeom prst="ellipse">
+              <a:avLst/>
+            </a:prstGeom>
+            <a:solidFill>
+              <a:srgbClr val="F8766D">
+                <a:alpha val="100000"/>
+              </a:srgbClr>
+            </a:solidFill>
+            <a:ln w="9000" cap="rnd">
+              <a:solidFill>
+                <a:srgbClr val="F8766D">
+                  <a:alpha val="100000"/>
+                </a:srgbClr>
+              </a:solidFill>
+              <a:prstDash val="solid"/>
+              <a:round/>
+            </a:ln>
+          </p:spPr>
+          <p:txBody>
+            <a:bodyPr/>
+            <a:lstStyle/>
+            <a:p/>
+          </p:txBody>
+        </p:sp>
+        <p:sp>
+          <p:nvSpPr>
+            <p:cNvPr id="90" name="pt89"/>
+            <p:cNvSpPr/>
+            <p:nvPr/>
+          </p:nvSpPr>
+          <p:spPr>
+            <a:xfrm>
+              <a:off x="4774478" y="2714497"/>
+              <a:ext cx="49651" cy="49651"/>
+            </a:xfrm>
+            <a:prstGeom prst="ellipse">
+              <a:avLst/>
+            </a:prstGeom>
+            <a:solidFill>
+              <a:srgbClr val="F8766D">
+                <a:alpha val="100000"/>
+              </a:srgbClr>
+            </a:solidFill>
+            <a:ln w="9000" cap="rnd">
+              <a:solidFill>
+                <a:srgbClr val="F8766D">
+                  <a:alpha val="100000"/>
+                </a:srgbClr>
+              </a:solidFill>
+              <a:prstDash val="solid"/>
+              <a:round/>
+            </a:ln>
+          </p:spPr>
+          <p:txBody>
+            <a:bodyPr/>
+            <a:lstStyle/>
+            <a:p/>
+          </p:txBody>
+        </p:sp>
+        <p:sp>
+          <p:nvSpPr>
+            <p:cNvPr id="91" name="pt90"/>
+            <p:cNvSpPr/>
+            <p:nvPr/>
+          </p:nvSpPr>
+          <p:spPr>
+            <a:xfrm>
+              <a:off x="4845202" y="2528031"/>
+              <a:ext cx="49651" cy="49651"/>
+            </a:xfrm>
+            <a:prstGeom prst="ellipse">
+              <a:avLst/>
+            </a:prstGeom>
+            <a:solidFill>
+              <a:srgbClr val="F8766D">
+                <a:alpha val="100000"/>
+              </a:srgbClr>
+            </a:solidFill>
+            <a:ln w="9000" cap="rnd">
+              <a:solidFill>
+                <a:srgbClr val="F8766D">
+                  <a:alpha val="100000"/>
+                </a:srgbClr>
+              </a:solidFill>
+              <a:prstDash val="solid"/>
+              <a:round/>
+            </a:ln>
+          </p:spPr>
+          <p:txBody>
+            <a:bodyPr/>
+            <a:lstStyle/>
+            <a:p/>
+          </p:txBody>
+        </p:sp>
+        <p:sp>
+          <p:nvSpPr>
+            <p:cNvPr id="92" name="pt91"/>
+            <p:cNvSpPr/>
+            <p:nvPr/>
+          </p:nvSpPr>
+          <p:spPr>
+            <a:xfrm>
+              <a:off x="4915925" y="2375285"/>
+              <a:ext cx="49651" cy="49651"/>
+            </a:xfrm>
+            <a:prstGeom prst="ellipse">
+              <a:avLst/>
+            </a:prstGeom>
+            <a:solidFill>
+              <a:srgbClr val="F8766D">
+                <a:alpha val="100000"/>
+              </a:srgbClr>
+            </a:solidFill>
+            <a:ln w="9000" cap="rnd">
+              <a:solidFill>
+                <a:srgbClr val="F8766D">
+                  <a:alpha val="100000"/>
+                </a:srgbClr>
+              </a:solidFill>
+              <a:prstDash val="solid"/>
+              <a:round/>
+            </a:ln>
+          </p:spPr>
+          <p:txBody>
+            <a:bodyPr/>
+            <a:lstStyle/>
+            <a:p/>
+          </p:txBody>
+        </p:sp>
+        <p:sp>
+          <p:nvSpPr>
+            <p:cNvPr id="93" name="pt92"/>
+            <p:cNvSpPr/>
+            <p:nvPr/>
+          </p:nvSpPr>
+          <p:spPr>
+            <a:xfrm>
+              <a:off x="4986649" y="2528220"/>
+              <a:ext cx="49651" cy="49651"/>
+            </a:xfrm>
+            <a:prstGeom prst="ellipse">
+              <a:avLst/>
+            </a:prstGeom>
+            <a:solidFill>
+              <a:srgbClr val="F8766D">
+                <a:alpha val="100000"/>
+              </a:srgbClr>
+            </a:solidFill>
+            <a:ln w="9000" cap="rnd">
+              <a:solidFill>
+                <a:srgbClr val="F8766D">
+                  <a:alpha val="100000"/>
+                </a:srgbClr>
+              </a:solidFill>
+              <a:prstDash val="solid"/>
+              <a:round/>
+            </a:ln>
+          </p:spPr>
+          <p:txBody>
+            <a:bodyPr/>
+            <a:lstStyle/>
+            <a:p/>
+          </p:txBody>
+        </p:sp>
+        <p:sp>
+          <p:nvSpPr>
+            <p:cNvPr id="94" name="pt93"/>
+            <p:cNvSpPr/>
+            <p:nvPr/>
+          </p:nvSpPr>
+          <p:spPr>
+            <a:xfrm>
+              <a:off x="5057372" y="2809556"/>
+              <a:ext cx="49651" cy="49651"/>
+            </a:xfrm>
+            <a:prstGeom prst="ellipse">
+              <a:avLst/>
+            </a:prstGeom>
+            <a:solidFill>
+              <a:srgbClr val="F8766D">
+                <a:alpha val="100000"/>
+              </a:srgbClr>
+            </a:solidFill>
+            <a:ln w="9000" cap="rnd">
+              <a:solidFill>
+                <a:srgbClr val="F8766D">
+                  <a:alpha val="100000"/>
+                </a:srgbClr>
+              </a:solidFill>
+              <a:prstDash val="solid"/>
+              <a:round/>
+            </a:ln>
+          </p:spPr>
+          <p:txBody>
+            <a:bodyPr/>
+            <a:lstStyle/>
+            <a:p/>
+          </p:txBody>
+        </p:sp>
+        <p:sp>
+          <p:nvSpPr>
+            <p:cNvPr id="95" name="pt94"/>
+            <p:cNvSpPr/>
+            <p:nvPr/>
+          </p:nvSpPr>
+          <p:spPr>
+            <a:xfrm>
+              <a:off x="5128096" y="3260761"/>
+              <a:ext cx="49651" cy="49651"/>
+            </a:xfrm>
+            <a:prstGeom prst="ellipse">
+              <a:avLst/>
+            </a:prstGeom>
+            <a:solidFill>
+              <a:srgbClr val="F8766D">
+                <a:alpha val="100000"/>
+              </a:srgbClr>
+            </a:solidFill>
+            <a:ln w="9000" cap="rnd">
+              <a:solidFill>
+                <a:srgbClr val="F8766D">
+                  <a:alpha val="100000"/>
+                </a:srgbClr>
+              </a:solidFill>
+              <a:prstDash val="solid"/>
+              <a:round/>
+            </a:ln>
+          </p:spPr>
+          <p:txBody>
+            <a:bodyPr/>
+            <a:lstStyle/>
+            <a:p/>
+          </p:txBody>
+        </p:sp>
+        <p:sp>
+          <p:nvSpPr>
+            <p:cNvPr id="96" name="pt95"/>
+            <p:cNvSpPr/>
+            <p:nvPr/>
+          </p:nvSpPr>
+          <p:spPr>
+            <a:xfrm>
+              <a:off x="5198819" y="3547107"/>
+              <a:ext cx="49651" cy="49651"/>
+            </a:xfrm>
+            <a:prstGeom prst="ellipse">
+              <a:avLst/>
+            </a:prstGeom>
+            <a:solidFill>
+              <a:srgbClr val="F8766D">
+                <a:alpha val="100000"/>
+              </a:srgbClr>
+            </a:solidFill>
+            <a:ln w="9000" cap="rnd">
+              <a:solidFill>
+                <a:srgbClr val="F8766D">
+                  <a:alpha val="100000"/>
+                </a:srgbClr>
+              </a:solidFill>
+              <a:prstDash val="solid"/>
+              <a:round/>
+            </a:ln>
+          </p:spPr>
+          <p:txBody>
+            <a:bodyPr/>
+            <a:lstStyle/>
+            <a:p/>
+          </p:txBody>
+        </p:sp>
+        <p:sp>
+          <p:nvSpPr>
+            <p:cNvPr id="97" name="pt96"/>
+            <p:cNvSpPr/>
+            <p:nvPr/>
+          </p:nvSpPr>
+          <p:spPr>
+            <a:xfrm>
+              <a:off x="5269543" y="3725776"/>
+              <a:ext cx="49651" cy="49651"/>
+            </a:xfrm>
+            <a:prstGeom prst="ellipse">
+              <a:avLst/>
+            </a:prstGeom>
+            <a:solidFill>
+              <a:srgbClr val="F8766D">
+                <a:alpha val="100000"/>
+              </a:srgbClr>
+            </a:solidFill>
+            <a:ln w="9000" cap="rnd">
+              <a:solidFill>
+                <a:srgbClr val="F8766D">
+                  <a:alpha val="100000"/>
+                </a:srgbClr>
+              </a:solidFill>
+              <a:prstDash val="solid"/>
+              <a:round/>
+            </a:ln>
+          </p:spPr>
+          <p:txBody>
+            <a:bodyPr/>
+            <a:lstStyle/>
+            <a:p/>
+          </p:txBody>
+        </p:sp>
+        <p:sp>
+          <p:nvSpPr>
+            <p:cNvPr id="98" name="pt97"/>
+            <p:cNvSpPr/>
+            <p:nvPr/>
+          </p:nvSpPr>
+          <p:spPr>
+            <a:xfrm>
+              <a:off x="5340266" y="3813041"/>
+              <a:ext cx="49651" cy="49651"/>
+            </a:xfrm>
+            <a:prstGeom prst="ellipse">
+              <a:avLst/>
+            </a:prstGeom>
+            <a:solidFill>
+              <a:srgbClr val="F8766D">
+                <a:alpha val="100000"/>
+              </a:srgbClr>
+            </a:solidFill>
+            <a:ln w="9000" cap="rnd">
+              <a:solidFill>
+                <a:srgbClr val="F8766D">
+                  <a:alpha val="100000"/>
+                </a:srgbClr>
+              </a:solidFill>
+              <a:prstDash val="solid"/>
+              <a:round/>
+            </a:ln>
+          </p:spPr>
+          <p:txBody>
+            <a:bodyPr/>
+            <a:lstStyle/>
+            <a:p/>
+          </p:txBody>
+        </p:sp>
+        <p:sp>
+          <p:nvSpPr>
+            <p:cNvPr id="99" name="pt98"/>
+            <p:cNvSpPr/>
+            <p:nvPr/>
+          </p:nvSpPr>
+          <p:spPr>
+            <a:xfrm>
+              <a:off x="5410990" y="3867834"/>
+              <a:ext cx="49651" cy="49651"/>
+            </a:xfrm>
+            <a:prstGeom prst="ellipse">
+              <a:avLst/>
+            </a:prstGeom>
+            <a:solidFill>
+              <a:srgbClr val="F8766D">
+                <a:alpha val="100000"/>
+              </a:srgbClr>
+            </a:solidFill>
+            <a:ln w="9000" cap="rnd">
+              <a:solidFill>
+                <a:srgbClr val="F8766D">
+                  <a:alpha val="100000"/>
+                </a:srgbClr>
+              </a:solidFill>
+              <a:prstDash val="solid"/>
+              <a:round/>
+            </a:ln>
+          </p:spPr>
+          <p:txBody>
+            <a:bodyPr/>
+            <a:lstStyle/>
+            <a:p/>
+          </p:txBody>
+        </p:sp>
+        <p:sp>
+          <p:nvSpPr>
+            <p:cNvPr id="100" name="tx99"/>
+            <p:cNvSpPr/>
+            <p:nvPr/>
+          </p:nvSpPr>
+          <p:spPr>
+            <a:xfrm>
+              <a:off x="1149684" y="3980782"/>
               <a:ext cx="248840" cy="84529"/>
             </a:xfrm>
             <a:prstGeom prst="rect">
@@ -4974,13 +6119,13 @@
         </p:sp>
         <p:sp>
           <p:nvSpPr>
-            <p:cNvPr id="71" name="tx70"/>
-            <p:cNvSpPr/>
-            <p:nvPr/>
-          </p:nvSpPr>
-          <p:spPr>
-            <a:xfrm>
-              <a:off x="1149684" y="3029825"/>
+            <p:cNvPr id="101" name="tx100"/>
+            <p:cNvSpPr/>
+            <p:nvPr/>
+          </p:nvSpPr>
+          <p:spPr>
+            <a:xfrm>
+              <a:off x="1149684" y="3134342"/>
               <a:ext cx="248840" cy="84529"/>
             </a:xfrm>
             <a:prstGeom prst="rect">
@@ -5020,13 +6165,13 @@
         </p:sp>
         <p:sp>
           <p:nvSpPr>
-            <p:cNvPr id="72" name="tx71"/>
-            <p:cNvSpPr/>
-            <p:nvPr/>
-          </p:nvSpPr>
-          <p:spPr>
-            <a:xfrm>
-              <a:off x="1149684" y="2063698"/>
+            <p:cNvPr id="102" name="tx101"/>
+            <p:cNvSpPr/>
+            <p:nvPr/>
+          </p:nvSpPr>
+          <p:spPr>
+            <a:xfrm>
+              <a:off x="1149684" y="2287901"/>
               <a:ext cx="248840" cy="84529"/>
             </a:xfrm>
             <a:prstGeom prst="rect">
@@ -5066,13 +6211,13 @@
         </p:sp>
         <p:sp>
           <p:nvSpPr>
-            <p:cNvPr id="73" name="tx72"/>
-            <p:cNvSpPr/>
-            <p:nvPr/>
-          </p:nvSpPr>
-          <p:spPr>
-            <a:xfrm>
-              <a:off x="1149684" y="1097570"/>
+            <p:cNvPr id="103" name="tx102"/>
+            <p:cNvSpPr/>
+            <p:nvPr/>
+          </p:nvSpPr>
+          <p:spPr>
+            <a:xfrm>
+              <a:off x="1149684" y="1441460"/>
               <a:ext cx="248840" cy="84529"/>
             </a:xfrm>
             <a:prstGeom prst="rect">
@@ -5112,13 +6257,13 @@
         </p:sp>
         <p:sp>
           <p:nvSpPr>
-            <p:cNvPr id="74" name="pl73"/>
-            <p:cNvSpPr/>
-            <p:nvPr/>
-          </p:nvSpPr>
-          <p:spPr>
-            <a:xfrm>
-              <a:off x="1426360" y="4039744"/>
+            <p:cNvPr id="104" name="pl103"/>
+            <p:cNvSpPr/>
+            <p:nvPr/>
+          </p:nvSpPr>
+          <p:spPr>
+            <a:xfrm>
+              <a:off x="1426360" y="4024575"/>
               <a:ext cx="34794" cy="0"/>
             </a:xfrm>
             <a:custGeom>
@@ -5152,13 +6297,13 @@
         </p:sp>
         <p:sp>
           <p:nvSpPr>
-            <p:cNvPr id="75" name="pl74"/>
-            <p:cNvSpPr/>
-            <p:nvPr/>
-          </p:nvSpPr>
-          <p:spPr>
-            <a:xfrm>
-              <a:off x="1426360" y="3073617"/>
+            <p:cNvPr id="105" name="pl104"/>
+            <p:cNvSpPr/>
+            <p:nvPr/>
+          </p:nvSpPr>
+          <p:spPr>
+            <a:xfrm>
+              <a:off x="1426360" y="3178134"/>
               <a:ext cx="34794" cy="0"/>
             </a:xfrm>
             <a:custGeom>
@@ -5192,13 +6337,13 @@
         </p:sp>
         <p:sp>
           <p:nvSpPr>
-            <p:cNvPr id="76" name="pl75"/>
-            <p:cNvSpPr/>
-            <p:nvPr/>
-          </p:nvSpPr>
-          <p:spPr>
-            <a:xfrm>
-              <a:off x="1426360" y="2107490"/>
+            <p:cNvPr id="106" name="pl105"/>
+            <p:cNvSpPr/>
+            <p:nvPr/>
+          </p:nvSpPr>
+          <p:spPr>
+            <a:xfrm>
+              <a:off x="1426360" y="2331694"/>
               <a:ext cx="34794" cy="0"/>
             </a:xfrm>
             <a:custGeom>
@@ -5232,13 +6377,13 @@
         </p:sp>
         <p:sp>
           <p:nvSpPr>
-            <p:cNvPr id="77" name="pl76"/>
-            <p:cNvSpPr/>
-            <p:nvPr/>
-          </p:nvSpPr>
-          <p:spPr>
-            <a:xfrm>
-              <a:off x="1426360" y="1141363"/>
+            <p:cNvPr id="107" name="pl106"/>
+            <p:cNvSpPr/>
+            <p:nvPr/>
+          </p:nvSpPr>
+          <p:spPr>
+            <a:xfrm>
+              <a:off x="1426360" y="1485253"/>
               <a:ext cx="34794" cy="0"/>
             </a:xfrm>
             <a:custGeom>
@@ -5272,7 +6417,7 @@
         </p:sp>
         <p:sp>
           <p:nvSpPr>
-            <p:cNvPr id="78" name="pl77"/>
+            <p:cNvPr id="108" name="pl107"/>
             <p:cNvSpPr/>
             <p:nvPr/>
           </p:nvSpPr>
@@ -5312,7 +6457,7 @@
         </p:sp>
         <p:sp>
           <p:nvSpPr>
-            <p:cNvPr id="79" name="pl78"/>
+            <p:cNvPr id="109" name="pl108"/>
             <p:cNvSpPr/>
             <p:nvPr/>
           </p:nvSpPr>
@@ -5352,7 +6497,7 @@
         </p:sp>
         <p:sp>
           <p:nvSpPr>
-            <p:cNvPr id="80" name="pl79"/>
+            <p:cNvPr id="110" name="pl109"/>
             <p:cNvSpPr/>
             <p:nvPr/>
           </p:nvSpPr>
@@ -5392,7 +6537,7 @@
         </p:sp>
         <p:sp>
           <p:nvSpPr>
-            <p:cNvPr id="81" name="pl80"/>
+            <p:cNvPr id="111" name="pl110"/>
             <p:cNvSpPr/>
             <p:nvPr/>
           </p:nvSpPr>
@@ -5432,7 +6577,7 @@
         </p:sp>
         <p:sp>
           <p:nvSpPr>
-            <p:cNvPr id="82" name="pl81"/>
+            <p:cNvPr id="112" name="pl111"/>
             <p:cNvSpPr/>
             <p:nvPr/>
           </p:nvSpPr>
@@ -5472,7 +6617,7 @@
         </p:sp>
         <p:sp>
           <p:nvSpPr>
-            <p:cNvPr id="83" name="pl82"/>
+            <p:cNvPr id="113" name="pl112"/>
             <p:cNvSpPr/>
             <p:nvPr/>
           </p:nvSpPr>
@@ -5512,7 +6657,7 @@
         </p:sp>
         <p:sp>
           <p:nvSpPr>
-            <p:cNvPr id="84" name="pl83"/>
+            <p:cNvPr id="114" name="pl113"/>
             <p:cNvSpPr/>
             <p:nvPr/>
           </p:nvSpPr>
@@ -5552,7 +6697,7 @@
         </p:sp>
         <p:sp>
           <p:nvSpPr>
-            <p:cNvPr id="85" name="pl84"/>
+            <p:cNvPr id="115" name="pl114"/>
             <p:cNvSpPr/>
             <p:nvPr/>
           </p:nvSpPr>
@@ -5592,7 +6737,7 @@
         </p:sp>
         <p:sp>
           <p:nvSpPr>
-            <p:cNvPr id="86" name="pl85"/>
+            <p:cNvPr id="116" name="pl115"/>
             <p:cNvSpPr/>
             <p:nvPr/>
           </p:nvSpPr>
@@ -5632,7 +6777,7 @@
         </p:sp>
         <p:sp>
           <p:nvSpPr>
-            <p:cNvPr id="87" name="pl86"/>
+            <p:cNvPr id="117" name="pl116"/>
             <p:cNvSpPr/>
             <p:nvPr/>
           </p:nvSpPr>
@@ -5672,7 +6817,7 @@
         </p:sp>
         <p:sp>
           <p:nvSpPr>
-            <p:cNvPr id="88" name="pl87"/>
+            <p:cNvPr id="118" name="pl117"/>
             <p:cNvSpPr/>
             <p:nvPr/>
           </p:nvSpPr>
@@ -5712,7 +6857,7 @@
         </p:sp>
         <p:sp>
           <p:nvSpPr>
-            <p:cNvPr id="89" name="pl88"/>
+            <p:cNvPr id="119" name="pl118"/>
             <p:cNvSpPr/>
             <p:nvPr/>
           </p:nvSpPr>
@@ -5752,7 +6897,7 @@
         </p:sp>
         <p:sp>
           <p:nvSpPr>
-            <p:cNvPr id="90" name="pl89"/>
+            <p:cNvPr id="120" name="pl119"/>
             <p:cNvSpPr/>
             <p:nvPr/>
           </p:nvSpPr>
@@ -5792,7 +6937,7 @@
         </p:sp>
         <p:sp>
           <p:nvSpPr>
-            <p:cNvPr id="91" name="pl90"/>
+            <p:cNvPr id="121" name="pl120"/>
             <p:cNvSpPr/>
             <p:nvPr/>
           </p:nvSpPr>
@@ -5832,7 +6977,7 @@
         </p:sp>
         <p:sp>
           <p:nvSpPr>
-            <p:cNvPr id="92" name="tx91"/>
+            <p:cNvPr id="122" name="tx121"/>
             <p:cNvSpPr/>
             <p:nvPr/>
           </p:nvSpPr>
@@ -5878,7 +7023,7 @@
         </p:sp>
         <p:sp>
           <p:nvSpPr>
-            <p:cNvPr id="93" name="tx92"/>
+            <p:cNvPr id="123" name="tx122"/>
             <p:cNvSpPr/>
             <p:nvPr/>
           </p:nvSpPr>
@@ -5924,7 +7069,7 @@
         </p:sp>
         <p:sp>
           <p:nvSpPr>
-            <p:cNvPr id="94" name="tx93"/>
+            <p:cNvPr id="124" name="tx123"/>
             <p:cNvSpPr/>
             <p:nvPr/>
           </p:nvSpPr>
@@ -5970,7 +7115,7 @@
         </p:sp>
         <p:sp>
           <p:nvSpPr>
-            <p:cNvPr id="95" name="tx94"/>
+            <p:cNvPr id="125" name="tx124"/>
             <p:cNvSpPr/>
             <p:nvPr/>
           </p:nvSpPr>
@@ -6016,7 +7161,7 @@
         </p:sp>
         <p:sp>
           <p:nvSpPr>
-            <p:cNvPr id="96" name="tx95"/>
+            <p:cNvPr id="126" name="tx125"/>
             <p:cNvSpPr/>
             <p:nvPr/>
           </p:nvSpPr>
@@ -6062,7 +7207,7 @@
         </p:sp>
         <p:sp>
           <p:nvSpPr>
-            <p:cNvPr id="97" name="tx96"/>
+            <p:cNvPr id="127" name="tx126"/>
             <p:cNvSpPr/>
             <p:nvPr/>
           </p:nvSpPr>
@@ -6108,7 +7253,7 @@
         </p:sp>
         <p:sp>
           <p:nvSpPr>
-            <p:cNvPr id="98" name="tx97"/>
+            <p:cNvPr id="128" name="tx127"/>
             <p:cNvSpPr/>
             <p:nvPr/>
           </p:nvSpPr>
@@ -6154,7 +7299,7 @@
         </p:sp>
         <p:sp>
           <p:nvSpPr>
-            <p:cNvPr id="99" name="tx98"/>
+            <p:cNvPr id="129" name="tx128"/>
             <p:cNvSpPr/>
             <p:nvPr/>
           </p:nvSpPr>
@@ -6200,7 +7345,7 @@
         </p:sp>
         <p:sp>
           <p:nvSpPr>
-            <p:cNvPr id="100" name="tx99"/>
+            <p:cNvPr id="130" name="tx129"/>
             <p:cNvSpPr/>
             <p:nvPr/>
           </p:nvSpPr>
@@ -6246,7 +7391,7 @@
         </p:sp>
         <p:sp>
           <p:nvSpPr>
-            <p:cNvPr id="101" name="tx100"/>
+            <p:cNvPr id="131" name="tx130"/>
             <p:cNvSpPr/>
             <p:nvPr/>
           </p:nvSpPr>
@@ -6292,7 +7437,7 @@
         </p:sp>
         <p:sp>
           <p:nvSpPr>
-            <p:cNvPr id="102" name="tx101"/>
+            <p:cNvPr id="132" name="tx131"/>
             <p:cNvSpPr/>
             <p:nvPr/>
           </p:nvSpPr>
@@ -6338,7 +7483,7 @@
         </p:sp>
         <p:sp>
           <p:nvSpPr>
-            <p:cNvPr id="103" name="tx102"/>
+            <p:cNvPr id="133" name="tx132"/>
             <p:cNvSpPr/>
             <p:nvPr/>
           </p:nvSpPr>
@@ -6384,7 +7529,7 @@
         </p:sp>
         <p:sp>
           <p:nvSpPr>
-            <p:cNvPr id="104" name="tx103"/>
+            <p:cNvPr id="134" name="tx133"/>
             <p:cNvSpPr/>
             <p:nvPr/>
           </p:nvSpPr>
@@ -6430,7 +7575,7 @@
         </p:sp>
         <p:sp>
           <p:nvSpPr>
-            <p:cNvPr id="105" name="tx104"/>
+            <p:cNvPr id="135" name="tx134"/>
             <p:cNvSpPr/>
             <p:nvPr/>
           </p:nvSpPr>
@@ -6476,7 +7621,7 @@
         </p:sp>
         <p:sp>
           <p:nvSpPr>
-            <p:cNvPr id="106" name="tx105"/>
+            <p:cNvPr id="136" name="tx135"/>
             <p:cNvSpPr/>
             <p:nvPr/>
           </p:nvSpPr>
@@ -6522,7 +7667,7 @@
         </p:sp>
         <p:sp>
           <p:nvSpPr>
-            <p:cNvPr id="107" name="tx106"/>
+            <p:cNvPr id="137" name="tx136"/>
             <p:cNvSpPr/>
             <p:nvPr/>
           </p:nvSpPr>
@@ -6568,7 +7713,7 @@
         </p:sp>
         <p:sp>
           <p:nvSpPr>
-            <p:cNvPr id="108" name="rc107"/>
+            <p:cNvPr id="138" name="rc137"/>
             <p:cNvSpPr/>
             <p:nvPr/>
           </p:nvSpPr>
@@ -6594,7 +7739,7 @@
         </p:sp>
         <p:sp>
           <p:nvSpPr>
-            <p:cNvPr id="109" name="tx108"/>
+            <p:cNvPr id="139" name="tx138"/>
             <p:cNvSpPr/>
             <p:nvPr/>
           </p:nvSpPr>
@@ -6640,7 +7785,7 @@
         </p:sp>
         <p:sp>
           <p:nvSpPr>
-            <p:cNvPr id="110" name="rc109"/>
+            <p:cNvPr id="140" name="rc139"/>
             <p:cNvSpPr/>
             <p:nvPr/>
           </p:nvSpPr>
@@ -6666,7 +7811,7 @@
         </p:sp>
         <p:sp>
           <p:nvSpPr>
-            <p:cNvPr id="111" name="pl110"/>
+            <p:cNvPr id="141" name="pl140"/>
             <p:cNvSpPr/>
             <p:nvPr/>
           </p:nvSpPr>
@@ -6706,7 +7851,7 @@
         </p:sp>
         <p:sp>
           <p:nvSpPr>
-            <p:cNvPr id="112" name="pt111"/>
+            <p:cNvPr id="142" name="pt141"/>
             <p:cNvSpPr/>
             <p:nvPr/>
           </p:nvSpPr>
@@ -6741,7 +7886,7 @@
         </p:sp>
         <p:sp>
           <p:nvSpPr>
-            <p:cNvPr id="113" name="tx112"/>
+            <p:cNvPr id="143" name="tx142"/>
             <p:cNvSpPr/>
             <p:nvPr/>
           </p:nvSpPr>

</xml_diff>